<commit_message>
Fixed spelling in name
</commit_message>
<xml_diff>
--- a/Praesentation.pptx
+++ b/Praesentation.pptx
@@ -111,6 +111,11 @@
       </a:defRPr>
     </a:lvl9pPr>
   </p:defaultTextStyle>
+  <p:extLst>
+    <p:ext uri="{EFAFB233-063F-42B5-8137-9DF3F51BA10A}">
+      <p15:sldGuideLst xmlns:p15="http://schemas.microsoft.com/office/powerpoint/2012/main"/>
+    </p:ext>
+  </p:extLst>
 </p:presentation>
 </file>
 
@@ -3011,7 +3016,7 @@
           <a:p>
             <a:r>
               <a:rPr lang="de-CH" dirty="0" smtClean="0"/>
-              <a:t>Lukas </a:t>
+              <a:t>Lucas </a:t>
             </a:r>
             <a:r>
               <a:rPr lang="de-CH" dirty="0" err="1" smtClean="0"/>
@@ -3462,7 +3467,23 @@
           <a:p>
             <a:r>
               <a:rPr lang="de-CH" dirty="0" smtClean="0"/>
-              <a:t>Persönliches Fazit Lukas </a:t>
+              <a:t>Persönliches </a:t>
+            </a:r>
+            <a:r>
+              <a:rPr lang="de-CH" smtClean="0"/>
+              <a:t>Fazit </a:t>
+            </a:r>
+            <a:r>
+              <a:rPr lang="de-CH" smtClean="0"/>
+              <a:t>Lu</a:t>
+            </a:r>
+            <a:r>
+              <a:rPr lang="de-CH"/>
+              <a:t>c</a:t>
+            </a:r>
+            <a:r>
+              <a:rPr lang="de-CH" smtClean="0"/>
+              <a:t>as </a:t>
             </a:r>
             <a:r>
               <a:rPr lang="de-CH" dirty="0" err="1" smtClean="0"/>

</xml_diff>

<commit_message>
add some basic content for presentation
</commit_message>
<xml_diff>
--- a/Praesentation.pptx
+++ b/Praesentation.pptx
@@ -4,6 +4,9 @@
   <p:sldMasterIdLst>
     <p:sldMasterId id="2147483648" r:id="rId1"/>
   </p:sldMasterIdLst>
+  <p:notesMasterIdLst>
+    <p:notesMasterId r:id="rId10"/>
+  </p:notesMasterIdLst>
   <p:sldIdLst>
     <p:sldId id="256" r:id="rId2"/>
     <p:sldId id="257" r:id="rId3"/>
@@ -119,6 +122,356 @@
 </p:presentation>
 </file>
 
+<file path=ppt/notesMasters/notesMaster1.xml><?xml version="1.0" encoding="utf-8"?>
+<p:notesMaster xmlns:a="http://schemas.openxmlformats.org/drawingml/2006/main" xmlns:r="http://schemas.openxmlformats.org/officeDocument/2006/relationships" xmlns:p="http://schemas.openxmlformats.org/presentationml/2006/main">
+  <p:cSld>
+    <p:bg>
+      <p:bgRef idx="1001">
+        <a:schemeClr val="bg1"/>
+      </p:bgRef>
+    </p:bg>
+    <p:spTree>
+      <p:nvGrpSpPr>
+        <p:cNvPr id="1" name=""/>
+        <p:cNvGrpSpPr/>
+        <p:nvPr/>
+      </p:nvGrpSpPr>
+      <p:grpSpPr>
+        <a:xfrm>
+          <a:off x="0" y="0"/>
+          <a:ext cx="0" cy="0"/>
+          <a:chOff x="0" y="0"/>
+          <a:chExt cx="0" cy="0"/>
+        </a:xfrm>
+      </p:grpSpPr>
+      <p:sp>
+        <p:nvSpPr>
+          <p:cNvPr id="2" name="Kopfzeilenplatzhalter 1"/>
+          <p:cNvSpPr>
+            <a:spLocks noGrp="1"/>
+          </p:cNvSpPr>
+          <p:nvPr>
+            <p:ph type="hdr" sz="quarter"/>
+          </p:nvPr>
+        </p:nvSpPr>
+        <p:spPr>
+          <a:xfrm>
+            <a:off x="0" y="0"/>
+            <a:ext cx="2971800" cy="458788"/>
+          </a:xfrm>
+          <a:prstGeom prst="rect">
+            <a:avLst/>
+          </a:prstGeom>
+        </p:spPr>
+        <p:txBody>
+          <a:bodyPr vert="horz" lIns="91440" tIns="45720" rIns="91440" bIns="45720" rtlCol="0"/>
+          <a:lstStyle>
+            <a:lvl1pPr algn="l">
+              <a:defRPr sz="1200"/>
+            </a:lvl1pPr>
+          </a:lstStyle>
+          <a:p>
+            <a:endParaRPr lang="de-CH"/>
+          </a:p>
+        </p:txBody>
+      </p:sp>
+      <p:sp>
+        <p:nvSpPr>
+          <p:cNvPr id="3" name="Datumsplatzhalter 2"/>
+          <p:cNvSpPr>
+            <a:spLocks noGrp="1"/>
+          </p:cNvSpPr>
+          <p:nvPr>
+            <p:ph type="dt" idx="1"/>
+          </p:nvPr>
+        </p:nvSpPr>
+        <p:spPr>
+          <a:xfrm>
+            <a:off x="3884613" y="0"/>
+            <a:ext cx="2971800" cy="458788"/>
+          </a:xfrm>
+          <a:prstGeom prst="rect">
+            <a:avLst/>
+          </a:prstGeom>
+        </p:spPr>
+        <p:txBody>
+          <a:bodyPr vert="horz" lIns="91440" tIns="45720" rIns="91440" bIns="45720" rtlCol="0"/>
+          <a:lstStyle>
+            <a:lvl1pPr algn="r">
+              <a:defRPr sz="1200"/>
+            </a:lvl1pPr>
+          </a:lstStyle>
+          <a:p>
+            <a:fld id="{464FB7A3-D3F6-BD43-9D8D-F228226847D9}" type="datetimeFigureOut">
+              <a:rPr lang="de-CH" smtClean="0"/>
+              <a:t>18.12.18</a:t>
+            </a:fld>
+            <a:endParaRPr lang="de-CH"/>
+          </a:p>
+        </p:txBody>
+      </p:sp>
+      <p:sp>
+        <p:nvSpPr>
+          <p:cNvPr id="4" name="Folienbildplatzhalter 3"/>
+          <p:cNvSpPr>
+            <a:spLocks noGrp="1" noRot="1" noChangeAspect="1"/>
+          </p:cNvSpPr>
+          <p:nvPr>
+            <p:ph type="sldImg" idx="2"/>
+          </p:nvPr>
+        </p:nvSpPr>
+        <p:spPr>
+          <a:xfrm>
+            <a:off x="685800" y="1143000"/>
+            <a:ext cx="5486400" cy="3086100"/>
+          </a:xfrm>
+          <a:prstGeom prst="rect">
+            <a:avLst/>
+          </a:prstGeom>
+          <a:noFill/>
+          <a:ln w="12700">
+            <a:solidFill>
+              <a:prstClr val="black"/>
+            </a:solidFill>
+          </a:ln>
+        </p:spPr>
+        <p:txBody>
+          <a:bodyPr vert="horz" lIns="91440" tIns="45720" rIns="91440" bIns="45720" rtlCol="0" anchor="ctr"/>
+          <a:lstStyle/>
+          <a:p>
+            <a:endParaRPr lang="de-CH"/>
+          </a:p>
+        </p:txBody>
+      </p:sp>
+      <p:sp>
+        <p:nvSpPr>
+          <p:cNvPr id="5" name="Notizenplatzhalter 4"/>
+          <p:cNvSpPr>
+            <a:spLocks noGrp="1"/>
+          </p:cNvSpPr>
+          <p:nvPr>
+            <p:ph type="body" sz="quarter" idx="3"/>
+          </p:nvPr>
+        </p:nvSpPr>
+        <p:spPr>
+          <a:xfrm>
+            <a:off x="685800" y="4400550"/>
+            <a:ext cx="5486400" cy="3600450"/>
+          </a:xfrm>
+          <a:prstGeom prst="rect">
+            <a:avLst/>
+          </a:prstGeom>
+        </p:spPr>
+        <p:txBody>
+          <a:bodyPr vert="horz" lIns="91440" tIns="45720" rIns="91440" bIns="45720" rtlCol="0"/>
+          <a:lstStyle/>
+          <a:p>
+            <a:pPr lvl="0"/>
+            <a:r>
+              <a:rPr lang="de-DE" smtClean="0"/>
+              <a:t>Mastertextformat bearbeiten</a:t>
+            </a:r>
+          </a:p>
+          <a:p>
+            <a:pPr lvl="1"/>
+            <a:r>
+              <a:rPr lang="de-DE" smtClean="0"/>
+              <a:t>Zweite Ebene</a:t>
+            </a:r>
+          </a:p>
+          <a:p>
+            <a:pPr lvl="2"/>
+            <a:r>
+              <a:rPr lang="de-DE" smtClean="0"/>
+              <a:t>Dritte Ebene</a:t>
+            </a:r>
+          </a:p>
+          <a:p>
+            <a:pPr lvl="3"/>
+            <a:r>
+              <a:rPr lang="de-DE" smtClean="0"/>
+              <a:t>Vierte Ebene</a:t>
+            </a:r>
+          </a:p>
+          <a:p>
+            <a:pPr lvl="4"/>
+            <a:r>
+              <a:rPr lang="de-DE" smtClean="0"/>
+              <a:t>Fünfte Ebene</a:t>
+            </a:r>
+            <a:endParaRPr lang="de-CH"/>
+          </a:p>
+        </p:txBody>
+      </p:sp>
+      <p:sp>
+        <p:nvSpPr>
+          <p:cNvPr id="6" name="Fußzeilenplatzhalter 5"/>
+          <p:cNvSpPr>
+            <a:spLocks noGrp="1"/>
+          </p:cNvSpPr>
+          <p:nvPr>
+            <p:ph type="ftr" sz="quarter" idx="4"/>
+          </p:nvPr>
+        </p:nvSpPr>
+        <p:spPr>
+          <a:xfrm>
+            <a:off x="0" y="8685213"/>
+            <a:ext cx="2971800" cy="458787"/>
+          </a:xfrm>
+          <a:prstGeom prst="rect">
+            <a:avLst/>
+          </a:prstGeom>
+        </p:spPr>
+        <p:txBody>
+          <a:bodyPr vert="horz" lIns="91440" tIns="45720" rIns="91440" bIns="45720" rtlCol="0" anchor="b"/>
+          <a:lstStyle>
+            <a:lvl1pPr algn="l">
+              <a:defRPr sz="1200"/>
+            </a:lvl1pPr>
+          </a:lstStyle>
+          <a:p>
+            <a:endParaRPr lang="de-CH"/>
+          </a:p>
+        </p:txBody>
+      </p:sp>
+      <p:sp>
+        <p:nvSpPr>
+          <p:cNvPr id="7" name="Foliennummernplatzhalter 6"/>
+          <p:cNvSpPr>
+            <a:spLocks noGrp="1"/>
+          </p:cNvSpPr>
+          <p:nvPr>
+            <p:ph type="sldNum" sz="quarter" idx="5"/>
+          </p:nvPr>
+        </p:nvSpPr>
+        <p:spPr>
+          <a:xfrm>
+            <a:off x="3884613" y="8685213"/>
+            <a:ext cx="2971800" cy="458787"/>
+          </a:xfrm>
+          <a:prstGeom prst="rect">
+            <a:avLst/>
+          </a:prstGeom>
+        </p:spPr>
+        <p:txBody>
+          <a:bodyPr vert="horz" lIns="91440" tIns="45720" rIns="91440" bIns="45720" rtlCol="0" anchor="b"/>
+          <a:lstStyle>
+            <a:lvl1pPr algn="r">
+              <a:defRPr sz="1200"/>
+            </a:lvl1pPr>
+          </a:lstStyle>
+          <a:p>
+            <a:fld id="{A39FD048-B5E1-D14B-995A-4EE00C5F7DBD}" type="slidenum">
+              <a:rPr lang="de-CH" smtClean="0"/>
+              <a:t>‹Nr.›</a:t>
+            </a:fld>
+            <a:endParaRPr lang="de-CH"/>
+          </a:p>
+        </p:txBody>
+      </p:sp>
+    </p:spTree>
+    <p:extLst>
+      <p:ext uri="{BB962C8B-B14F-4D97-AF65-F5344CB8AC3E}">
+        <p14:creationId xmlns:p14="http://schemas.microsoft.com/office/powerpoint/2010/main" val="928963811"/>
+      </p:ext>
+    </p:extLst>
+  </p:cSld>
+  <p:clrMap bg1="lt1" tx1="dk1" bg2="lt2" tx2="dk2" accent1="accent1" accent2="accent2" accent3="accent3" accent4="accent4" accent5="accent5" accent6="accent6" hlink="hlink" folHlink="folHlink"/>
+  <p:notesStyle>
+    <a:lvl1pPr marL="0" algn="l" defTabSz="914400" rtl="0" eaLnBrk="1" latinLnBrk="0" hangingPunct="1">
+      <a:defRPr sz="1200" kern="1200">
+        <a:solidFill>
+          <a:schemeClr val="tx1"/>
+        </a:solidFill>
+        <a:latin typeface="+mn-lt"/>
+        <a:ea typeface="+mn-ea"/>
+        <a:cs typeface="+mn-cs"/>
+      </a:defRPr>
+    </a:lvl1pPr>
+    <a:lvl2pPr marL="457200" algn="l" defTabSz="914400" rtl="0" eaLnBrk="1" latinLnBrk="0" hangingPunct="1">
+      <a:defRPr sz="1200" kern="1200">
+        <a:solidFill>
+          <a:schemeClr val="tx1"/>
+        </a:solidFill>
+        <a:latin typeface="+mn-lt"/>
+        <a:ea typeface="+mn-ea"/>
+        <a:cs typeface="+mn-cs"/>
+      </a:defRPr>
+    </a:lvl2pPr>
+    <a:lvl3pPr marL="914400" algn="l" defTabSz="914400" rtl="0" eaLnBrk="1" latinLnBrk="0" hangingPunct="1">
+      <a:defRPr sz="1200" kern="1200">
+        <a:solidFill>
+          <a:schemeClr val="tx1"/>
+        </a:solidFill>
+        <a:latin typeface="+mn-lt"/>
+        <a:ea typeface="+mn-ea"/>
+        <a:cs typeface="+mn-cs"/>
+      </a:defRPr>
+    </a:lvl3pPr>
+    <a:lvl4pPr marL="1371600" algn="l" defTabSz="914400" rtl="0" eaLnBrk="1" latinLnBrk="0" hangingPunct="1">
+      <a:defRPr sz="1200" kern="1200">
+        <a:solidFill>
+          <a:schemeClr val="tx1"/>
+        </a:solidFill>
+        <a:latin typeface="+mn-lt"/>
+        <a:ea typeface="+mn-ea"/>
+        <a:cs typeface="+mn-cs"/>
+      </a:defRPr>
+    </a:lvl4pPr>
+    <a:lvl5pPr marL="1828800" algn="l" defTabSz="914400" rtl="0" eaLnBrk="1" latinLnBrk="0" hangingPunct="1">
+      <a:defRPr sz="1200" kern="1200">
+        <a:solidFill>
+          <a:schemeClr val="tx1"/>
+        </a:solidFill>
+        <a:latin typeface="+mn-lt"/>
+        <a:ea typeface="+mn-ea"/>
+        <a:cs typeface="+mn-cs"/>
+      </a:defRPr>
+    </a:lvl5pPr>
+    <a:lvl6pPr marL="2286000" algn="l" defTabSz="914400" rtl="0" eaLnBrk="1" latinLnBrk="0" hangingPunct="1">
+      <a:defRPr sz="1200" kern="1200">
+        <a:solidFill>
+          <a:schemeClr val="tx1"/>
+        </a:solidFill>
+        <a:latin typeface="+mn-lt"/>
+        <a:ea typeface="+mn-ea"/>
+        <a:cs typeface="+mn-cs"/>
+      </a:defRPr>
+    </a:lvl6pPr>
+    <a:lvl7pPr marL="2743200" algn="l" defTabSz="914400" rtl="0" eaLnBrk="1" latinLnBrk="0" hangingPunct="1">
+      <a:defRPr sz="1200" kern="1200">
+        <a:solidFill>
+          <a:schemeClr val="tx1"/>
+        </a:solidFill>
+        <a:latin typeface="+mn-lt"/>
+        <a:ea typeface="+mn-ea"/>
+        <a:cs typeface="+mn-cs"/>
+      </a:defRPr>
+    </a:lvl7pPr>
+    <a:lvl8pPr marL="3200400" algn="l" defTabSz="914400" rtl="0" eaLnBrk="1" latinLnBrk="0" hangingPunct="1">
+      <a:defRPr sz="1200" kern="1200">
+        <a:solidFill>
+          <a:schemeClr val="tx1"/>
+        </a:solidFill>
+        <a:latin typeface="+mn-lt"/>
+        <a:ea typeface="+mn-ea"/>
+        <a:cs typeface="+mn-cs"/>
+      </a:defRPr>
+    </a:lvl8pPr>
+    <a:lvl9pPr marL="3657600" algn="l" defTabSz="914400" rtl="0" eaLnBrk="1" latinLnBrk="0" hangingPunct="1">
+      <a:defRPr sz="1200" kern="1200">
+        <a:solidFill>
+          <a:schemeClr val="tx1"/>
+        </a:solidFill>
+        <a:latin typeface="+mn-lt"/>
+        <a:ea typeface="+mn-ea"/>
+        <a:cs typeface="+mn-cs"/>
+      </a:defRPr>
+    </a:lvl9pPr>
+  </p:notesStyle>
+</p:notesMaster>
+</file>
+
 <file path=ppt/slideLayouts/slideLayout1.xml><?xml version="1.0" encoding="utf-8"?>
 <p:sldLayout xmlns:a="http://schemas.openxmlformats.org/drawingml/2006/main" xmlns:r="http://schemas.openxmlformats.org/officeDocument/2006/relationships" xmlns:p="http://schemas.openxmlformats.org/presentationml/2006/main" type="title" preserve="1">
   <p:cSld name="Title Slide">
@@ -250,7 +603,7 @@
           <a:p>
             <a:fld id="{9DB3CB91-4650-4E7E-8330-F432546D6CA1}" type="datetimeFigureOut">
               <a:rPr lang="de-CH" smtClean="0"/>
-              <a:t>07.12.2018</a:t>
+              <a:t>18.12.18</a:t>
             </a:fld>
             <a:endParaRPr lang="de-CH"/>
           </a:p>
@@ -292,7 +645,7 @@
           <a:p>
             <a:fld id="{1C34969C-F2FF-4877-8080-50A3B0756916}" type="slidenum">
               <a:rPr lang="de-CH" smtClean="0"/>
-              <a:t>‹#›</a:t>
+              <a:t>‹Nr.›</a:t>
             </a:fld>
             <a:endParaRPr lang="de-CH"/>
           </a:p>
@@ -420,7 +773,7 @@
           <a:p>
             <a:fld id="{9DB3CB91-4650-4E7E-8330-F432546D6CA1}" type="datetimeFigureOut">
               <a:rPr lang="de-CH" smtClean="0"/>
-              <a:t>07.12.2018</a:t>
+              <a:t>18.12.18</a:t>
             </a:fld>
             <a:endParaRPr lang="de-CH"/>
           </a:p>
@@ -462,7 +815,7 @@
           <a:p>
             <a:fld id="{1C34969C-F2FF-4877-8080-50A3B0756916}" type="slidenum">
               <a:rPr lang="de-CH" smtClean="0"/>
-              <a:t>‹#›</a:t>
+              <a:t>‹Nr.›</a:t>
             </a:fld>
             <a:endParaRPr lang="de-CH"/>
           </a:p>
@@ -600,7 +953,7 @@
           <a:p>
             <a:fld id="{9DB3CB91-4650-4E7E-8330-F432546D6CA1}" type="datetimeFigureOut">
               <a:rPr lang="de-CH" smtClean="0"/>
-              <a:t>07.12.2018</a:t>
+              <a:t>18.12.18</a:t>
             </a:fld>
             <a:endParaRPr lang="de-CH"/>
           </a:p>
@@ -642,7 +995,7 @@
           <a:p>
             <a:fld id="{1C34969C-F2FF-4877-8080-50A3B0756916}" type="slidenum">
               <a:rPr lang="de-CH" smtClean="0"/>
-              <a:t>‹#›</a:t>
+              <a:t>‹Nr.›</a:t>
             </a:fld>
             <a:endParaRPr lang="de-CH"/>
           </a:p>
@@ -770,7 +1123,7 @@
           <a:p>
             <a:fld id="{9DB3CB91-4650-4E7E-8330-F432546D6CA1}" type="datetimeFigureOut">
               <a:rPr lang="de-CH" smtClean="0"/>
-              <a:t>07.12.2018</a:t>
+              <a:t>18.12.18</a:t>
             </a:fld>
             <a:endParaRPr lang="de-CH"/>
           </a:p>
@@ -812,7 +1165,7 @@
           <a:p>
             <a:fld id="{1C34969C-F2FF-4877-8080-50A3B0756916}" type="slidenum">
               <a:rPr lang="de-CH" smtClean="0"/>
-              <a:t>‹#›</a:t>
+              <a:t>‹Nr.›</a:t>
             </a:fld>
             <a:endParaRPr lang="de-CH"/>
           </a:p>
@@ -1016,7 +1369,7 @@
           <a:p>
             <a:fld id="{9DB3CB91-4650-4E7E-8330-F432546D6CA1}" type="datetimeFigureOut">
               <a:rPr lang="de-CH" smtClean="0"/>
-              <a:t>07.12.2018</a:t>
+              <a:t>18.12.18</a:t>
             </a:fld>
             <a:endParaRPr lang="de-CH"/>
           </a:p>
@@ -1058,7 +1411,7 @@
           <a:p>
             <a:fld id="{1C34969C-F2FF-4877-8080-50A3B0756916}" type="slidenum">
               <a:rPr lang="de-CH" smtClean="0"/>
-              <a:t>‹#›</a:t>
+              <a:t>‹Nr.›</a:t>
             </a:fld>
             <a:endParaRPr lang="de-CH"/>
           </a:p>
@@ -1248,7 +1601,7 @@
           <a:p>
             <a:fld id="{9DB3CB91-4650-4E7E-8330-F432546D6CA1}" type="datetimeFigureOut">
               <a:rPr lang="de-CH" smtClean="0"/>
-              <a:t>07.12.2018</a:t>
+              <a:t>18.12.18</a:t>
             </a:fld>
             <a:endParaRPr lang="de-CH"/>
           </a:p>
@@ -1290,7 +1643,7 @@
           <a:p>
             <a:fld id="{1C34969C-F2FF-4877-8080-50A3B0756916}" type="slidenum">
               <a:rPr lang="de-CH" smtClean="0"/>
-              <a:t>‹#›</a:t>
+              <a:t>‹Nr.›</a:t>
             </a:fld>
             <a:endParaRPr lang="de-CH"/>
           </a:p>
@@ -1615,7 +1968,7 @@
           <a:p>
             <a:fld id="{9DB3CB91-4650-4E7E-8330-F432546D6CA1}" type="datetimeFigureOut">
               <a:rPr lang="de-CH" smtClean="0"/>
-              <a:t>07.12.2018</a:t>
+              <a:t>18.12.18</a:t>
             </a:fld>
             <a:endParaRPr lang="de-CH"/>
           </a:p>
@@ -1657,7 +2010,7 @@
           <a:p>
             <a:fld id="{1C34969C-F2FF-4877-8080-50A3B0756916}" type="slidenum">
               <a:rPr lang="de-CH" smtClean="0"/>
-              <a:t>‹#›</a:t>
+              <a:t>‹Nr.›</a:t>
             </a:fld>
             <a:endParaRPr lang="de-CH"/>
           </a:p>
@@ -1733,7 +2086,7 @@
           <a:p>
             <a:fld id="{9DB3CB91-4650-4E7E-8330-F432546D6CA1}" type="datetimeFigureOut">
               <a:rPr lang="de-CH" smtClean="0"/>
-              <a:t>07.12.2018</a:t>
+              <a:t>18.12.18</a:t>
             </a:fld>
             <a:endParaRPr lang="de-CH"/>
           </a:p>
@@ -1775,7 +2128,7 @@
           <a:p>
             <a:fld id="{1C34969C-F2FF-4877-8080-50A3B0756916}" type="slidenum">
               <a:rPr lang="de-CH" smtClean="0"/>
-              <a:t>‹#›</a:t>
+              <a:t>‹Nr.›</a:t>
             </a:fld>
             <a:endParaRPr lang="de-CH"/>
           </a:p>
@@ -1828,7 +2181,7 @@
           <a:p>
             <a:fld id="{9DB3CB91-4650-4E7E-8330-F432546D6CA1}" type="datetimeFigureOut">
               <a:rPr lang="de-CH" smtClean="0"/>
-              <a:t>07.12.2018</a:t>
+              <a:t>18.12.18</a:t>
             </a:fld>
             <a:endParaRPr lang="de-CH"/>
           </a:p>
@@ -1870,7 +2223,7 @@
           <a:p>
             <a:fld id="{1C34969C-F2FF-4877-8080-50A3B0756916}" type="slidenum">
               <a:rPr lang="de-CH" smtClean="0"/>
-              <a:t>‹#›</a:t>
+              <a:t>‹Nr.›</a:t>
             </a:fld>
             <a:endParaRPr lang="de-CH"/>
           </a:p>
@@ -2105,7 +2458,7 @@
           <a:p>
             <a:fld id="{9DB3CB91-4650-4E7E-8330-F432546D6CA1}" type="datetimeFigureOut">
               <a:rPr lang="de-CH" smtClean="0"/>
-              <a:t>07.12.2018</a:t>
+              <a:t>18.12.18</a:t>
             </a:fld>
             <a:endParaRPr lang="de-CH"/>
           </a:p>
@@ -2147,7 +2500,7 @@
           <a:p>
             <a:fld id="{1C34969C-F2FF-4877-8080-50A3B0756916}" type="slidenum">
               <a:rPr lang="de-CH" smtClean="0"/>
-              <a:t>‹#›</a:t>
+              <a:t>‹Nr.›</a:t>
             </a:fld>
             <a:endParaRPr lang="de-CH"/>
           </a:p>
@@ -2358,7 +2711,7 @@
           <a:p>
             <a:fld id="{9DB3CB91-4650-4E7E-8330-F432546D6CA1}" type="datetimeFigureOut">
               <a:rPr lang="de-CH" smtClean="0"/>
-              <a:t>07.12.2018</a:t>
+              <a:t>18.12.18</a:t>
             </a:fld>
             <a:endParaRPr lang="de-CH"/>
           </a:p>
@@ -2400,7 +2753,7 @@
           <a:p>
             <a:fld id="{1C34969C-F2FF-4877-8080-50A3B0756916}" type="slidenum">
               <a:rPr lang="de-CH" smtClean="0"/>
-              <a:t>‹#›</a:t>
+              <a:t>‹Nr.›</a:t>
             </a:fld>
             <a:endParaRPr lang="de-CH"/>
           </a:p>
@@ -2459,9 +2812,12 @@
           <a:prstGeom prst="rect">
             <a:avLst/>
           </a:prstGeom>
+          <a:solidFill>
+            <a:srgbClr val="F7A747"/>
+          </a:solidFill>
         </p:spPr>
         <p:txBody>
-          <a:bodyPr vert="horz" lIns="91440" tIns="45720" rIns="91440" bIns="45720" rtlCol="0" anchor="ctr">
+          <a:bodyPr vert="horz" lIns="360000" tIns="360000" rIns="360000" bIns="360000" rtlCol="0" anchor="ctr">
             <a:normAutofit/>
           </a:bodyPr>
           <a:lstStyle/>
@@ -2470,7 +2826,7 @@
               <a:rPr lang="en-US" smtClean="0"/>
               <a:t>Click to edit Master title style</a:t>
             </a:r>
-            <a:endParaRPr lang="de-CH"/>
+            <a:endParaRPr lang="de-CH" dirty="0"/>
           </a:p>
         </p:txBody>
       </p:sp>
@@ -2486,8 +2842,8 @@
         </p:nvSpPr>
         <p:spPr>
           <a:xfrm>
-            <a:off x="838200" y="1825625"/>
-            <a:ext cx="10515600" cy="4351338"/>
+            <a:off x="838200" y="2049137"/>
+            <a:ext cx="10515600" cy="4127826"/>
           </a:xfrm>
           <a:prstGeom prst="rect">
             <a:avLst/>
@@ -2565,13 +2921,17 @@
                     <a:tint val="75000"/>
                   </a:schemeClr>
                 </a:solidFill>
+                <a:latin typeface="Marker Felt Thin" charset="0"/>
+                <a:ea typeface="Marker Felt Thin" charset="0"/>
+                <a:cs typeface="Marker Felt Thin" charset="0"/>
               </a:defRPr>
             </a:lvl1pPr>
           </a:lstStyle>
           <a:p>
             <a:fld id="{9DB3CB91-4650-4E7E-8330-F432546D6CA1}" type="datetimeFigureOut">
               <a:rPr lang="de-CH" smtClean="0"/>
-              <a:t>07.12.2018</a:t>
+              <a:pPr/>
+              <a:t>18.12.18</a:t>
             </a:fld>
             <a:endParaRPr lang="de-CH"/>
           </a:p>
@@ -2606,6 +2966,9 @@
                     <a:tint val="75000"/>
                   </a:schemeClr>
                 </a:solidFill>
+                <a:latin typeface="Marker Felt Thin" charset="0"/>
+                <a:ea typeface="Marker Felt Thin" charset="0"/>
+                <a:cs typeface="Marker Felt Thin" charset="0"/>
               </a:defRPr>
             </a:lvl1pPr>
           </a:lstStyle>
@@ -2643,13 +3006,17 @@
                     <a:tint val="75000"/>
                   </a:schemeClr>
                 </a:solidFill>
+                <a:latin typeface="Marker Felt Thin" charset="0"/>
+                <a:ea typeface="Marker Felt Thin" charset="0"/>
+                <a:cs typeface="Marker Felt Thin" charset="0"/>
               </a:defRPr>
             </a:lvl1pPr>
           </a:lstStyle>
           <a:p>
             <a:fld id="{1C34969C-F2FF-4877-8080-50A3B0756916}" type="slidenum">
               <a:rPr lang="de-CH" smtClean="0"/>
-              <a:t>‹#›</a:t>
+              <a:pPr/>
+              <a:t>‹Nr.›</a:t>
             </a:fld>
             <a:endParaRPr lang="de-CH"/>
           </a:p>
@@ -2688,11 +3055,11 @@
         <a:buNone/>
         <a:defRPr sz="4400" kern="1200">
           <a:solidFill>
-            <a:schemeClr val="tx1"/>
+            <a:schemeClr val="bg1"/>
           </a:solidFill>
-          <a:latin typeface="+mj-lt"/>
-          <a:ea typeface="+mj-ea"/>
-          <a:cs typeface="+mj-cs"/>
+          <a:latin typeface="Marker Felt Thin" charset="0"/>
+          <a:ea typeface="Marker Felt Thin" charset="0"/>
+          <a:cs typeface="Marker Felt Thin" charset="0"/>
         </a:defRPr>
       </a:lvl1pPr>
     </p:titleStyle>
@@ -2710,9 +3077,9 @@
           <a:solidFill>
             <a:schemeClr val="tx1"/>
           </a:solidFill>
-          <a:latin typeface="+mn-lt"/>
-          <a:ea typeface="+mn-ea"/>
-          <a:cs typeface="+mn-cs"/>
+          <a:latin typeface="Marker Felt Thin" charset="0"/>
+          <a:ea typeface="Marker Felt Thin" charset="0"/>
+          <a:cs typeface="Marker Felt Thin" charset="0"/>
         </a:defRPr>
       </a:lvl1pPr>
       <a:lvl2pPr marL="685800" indent="-228600" algn="l" defTabSz="914400" rtl="0" eaLnBrk="1" latinLnBrk="0" hangingPunct="1">
@@ -2728,9 +3095,9 @@
           <a:solidFill>
             <a:schemeClr val="tx1"/>
           </a:solidFill>
-          <a:latin typeface="+mn-lt"/>
-          <a:ea typeface="+mn-ea"/>
-          <a:cs typeface="+mn-cs"/>
+          <a:latin typeface="Marker Felt Thin" charset="0"/>
+          <a:ea typeface="Marker Felt Thin" charset="0"/>
+          <a:cs typeface="Marker Felt Thin" charset="0"/>
         </a:defRPr>
       </a:lvl2pPr>
       <a:lvl3pPr marL="1143000" indent="-228600" algn="l" defTabSz="914400" rtl="0" eaLnBrk="1" latinLnBrk="0" hangingPunct="1">
@@ -2746,9 +3113,9 @@
           <a:solidFill>
             <a:schemeClr val="tx1"/>
           </a:solidFill>
-          <a:latin typeface="+mn-lt"/>
-          <a:ea typeface="+mn-ea"/>
-          <a:cs typeface="+mn-cs"/>
+          <a:latin typeface="Marker Felt Thin" charset="0"/>
+          <a:ea typeface="Marker Felt Thin" charset="0"/>
+          <a:cs typeface="Marker Felt Thin" charset="0"/>
         </a:defRPr>
       </a:lvl3pPr>
       <a:lvl4pPr marL="1600200" indent="-228600" algn="l" defTabSz="914400" rtl="0" eaLnBrk="1" latinLnBrk="0" hangingPunct="1">
@@ -2764,9 +3131,9 @@
           <a:solidFill>
             <a:schemeClr val="tx1"/>
           </a:solidFill>
-          <a:latin typeface="+mn-lt"/>
-          <a:ea typeface="+mn-ea"/>
-          <a:cs typeface="+mn-cs"/>
+          <a:latin typeface="Marker Felt Thin" charset="0"/>
+          <a:ea typeface="Marker Felt Thin" charset="0"/>
+          <a:cs typeface="Marker Felt Thin" charset="0"/>
         </a:defRPr>
       </a:lvl4pPr>
       <a:lvl5pPr marL="2057400" indent="-228600" algn="l" defTabSz="914400" rtl="0" eaLnBrk="1" latinLnBrk="0" hangingPunct="1">
@@ -2782,9 +3149,9 @@
           <a:solidFill>
             <a:schemeClr val="tx1"/>
           </a:solidFill>
-          <a:latin typeface="+mn-lt"/>
-          <a:ea typeface="+mn-ea"/>
-          <a:cs typeface="+mn-cs"/>
+          <a:latin typeface="Marker Felt Thin" charset="0"/>
+          <a:ea typeface="Marker Felt Thin" charset="0"/>
+          <a:cs typeface="Marker Felt Thin" charset="0"/>
         </a:defRPr>
       </a:lvl5pPr>
       <a:lvl6pPr marL="2514600" indent="-228600" algn="l" defTabSz="914400" rtl="0" eaLnBrk="1" latinLnBrk="0" hangingPunct="1">
@@ -2978,29 +3345,6 @@
       </p:grpSpPr>
       <p:sp>
         <p:nvSpPr>
-          <p:cNvPr id="2" name="Title 1"/>
-          <p:cNvSpPr>
-            <a:spLocks noGrp="1"/>
-          </p:cNvSpPr>
-          <p:nvPr>
-            <p:ph type="ctrTitle"/>
-          </p:nvPr>
-        </p:nvSpPr>
-        <p:spPr/>
-        <p:txBody>
-          <a:bodyPr/>
-          <a:lstStyle/>
-          <a:p>
-            <a:r>
-              <a:rPr lang="de-CH" dirty="0" err="1" smtClean="0"/>
-              <a:t>Scratch</a:t>
-            </a:r>
-            <a:endParaRPr lang="de-CH" dirty="0"/>
-          </a:p>
-        </p:txBody>
-      </p:sp>
-      <p:sp>
-        <p:nvSpPr>
           <p:cNvPr id="3" name="Subtitle 2"/>
           <p:cNvSpPr>
             <a:spLocks noGrp="1"/>
@@ -3009,27 +3353,102 @@
             <p:ph type="subTitle" idx="1"/>
           </p:nvPr>
         </p:nvSpPr>
-        <p:spPr/>
-        <p:txBody>
-          <a:bodyPr/>
-          <a:lstStyle/>
-          <a:p>
-            <a:r>
-              <a:rPr lang="de-CH" dirty="0" smtClean="0"/>
+        <p:spPr>
+          <a:xfrm>
+            <a:off x="1523999" y="4902028"/>
+            <a:ext cx="9144000" cy="1655762"/>
+          </a:xfrm>
+        </p:spPr>
+        <p:txBody>
+          <a:bodyPr/>
+          <a:lstStyle/>
+          <a:p>
+            <a:r>
+              <a:rPr lang="de-CH" dirty="0" smtClean="0">
+                <a:latin typeface="Helvetica Neue" charset="0"/>
+                <a:ea typeface="Helvetica Neue" charset="0"/>
+                <a:cs typeface="Helvetica Neue" charset="0"/>
+              </a:rPr>
               <a:t>Lucas </a:t>
             </a:r>
             <a:r>
-              <a:rPr lang="de-CH" dirty="0" err="1" smtClean="0"/>
+              <a:rPr lang="de-CH" dirty="0" err="1" smtClean="0">
+                <a:latin typeface="Helvetica Neue" charset="0"/>
+                <a:ea typeface="Helvetica Neue" charset="0"/>
+                <a:cs typeface="Helvetica Neue" charset="0"/>
+              </a:rPr>
               <a:t>Schnüriger</a:t>
             </a:r>
             <a:r>
-              <a:rPr lang="de-CH" dirty="0" smtClean="0"/>
+              <a:rPr lang="de-CH" dirty="0" smtClean="0">
+                <a:latin typeface="Helvetica Neue" charset="0"/>
+                <a:ea typeface="Helvetica Neue" charset="0"/>
+                <a:cs typeface="Helvetica Neue" charset="0"/>
+              </a:rPr>
               <a:t> &amp; Valentin Bürgler</a:t>
             </a:r>
-            <a:endParaRPr lang="de-CH" dirty="0"/>
-          </a:p>
-        </p:txBody>
-      </p:sp>
+            <a:endParaRPr lang="de-CH" dirty="0">
+              <a:latin typeface="Helvetica Neue" charset="0"/>
+              <a:ea typeface="Helvetica Neue" charset="0"/>
+              <a:cs typeface="Helvetica Neue" charset="0"/>
+            </a:endParaRPr>
+          </a:p>
+        </p:txBody>
+      </p:sp>
+      <p:pic>
+        <p:nvPicPr>
+          <p:cNvPr id="7" name="Bild 6"/>
+          <p:cNvPicPr>
+            <a:picLocks noChangeAspect="1"/>
+          </p:cNvPicPr>
+          <p:nvPr/>
+        </p:nvPicPr>
+        <p:blipFill>
+          <a:blip r:embed="rId2"/>
+          <a:stretch>
+            <a:fillRect/>
+          </a:stretch>
+        </p:blipFill>
+        <p:spPr>
+          <a:xfrm>
+            <a:off x="1576085" y="1049703"/>
+            <a:ext cx="9039828" cy="2753854"/>
+          </a:xfrm>
+          <a:prstGeom prst="rect">
+            <a:avLst/>
+          </a:prstGeom>
+        </p:spPr>
+      </p:pic>
+      <p:pic>
+        <p:nvPicPr>
+          <p:cNvPr id="9" name="Bild 8"/>
+          <p:cNvPicPr>
+            <a:picLocks noChangeAspect="1"/>
+          </p:cNvPicPr>
+          <p:nvPr/>
+        </p:nvPicPr>
+        <p:blipFill>
+          <a:blip r:embed="rId3">
+            <a:extLst>
+              <a:ext uri="{28A0092B-C50C-407E-A947-70E740481C1C}">
+                <a14:useLocalDpi xmlns:a14="http://schemas.microsoft.com/office/drawing/2010/main" val="0"/>
+              </a:ext>
+            </a:extLst>
+          </a:blip>
+          <a:stretch>
+            <a:fillRect/>
+          </a:stretch>
+        </p:blipFill>
+        <p:spPr>
+          <a:xfrm>
+            <a:off x="444346" y="4169714"/>
+            <a:ext cx="2159306" cy="2388076"/>
+          </a:xfrm>
+          <a:prstGeom prst="rect">
+            <a:avLst/>
+          </a:prstGeom>
+        </p:spPr>
+      </p:pic>
     </p:spTree>
     <p:extLst>
       <p:ext uri="{BB962C8B-B14F-4D97-AF65-F5344CB8AC3E}">
@@ -3098,10 +3517,103 @@
           <a:bodyPr/>
           <a:lstStyle/>
           <a:p>
-            <a:endParaRPr lang="de-CH"/>
-          </a:p>
-        </p:txBody>
-      </p:sp>
+            <a:r>
+              <a:rPr lang="de-CH" dirty="0" smtClean="0"/>
+              <a:t>Erste Version 2007</a:t>
+            </a:r>
+          </a:p>
+          <a:p>
+            <a:r>
+              <a:rPr lang="de-CH" dirty="0"/>
+              <a:t>v</a:t>
+            </a:r>
+            <a:r>
+              <a:rPr lang="de-CH" dirty="0" smtClean="0"/>
+              <a:t>on MIT Professor Mitchel </a:t>
+            </a:r>
+            <a:r>
+              <a:rPr lang="de-CH" dirty="0" err="1" smtClean="0"/>
+              <a:t>Resnick</a:t>
+            </a:r>
+            <a:endParaRPr lang="de-CH" dirty="0" smtClean="0"/>
+          </a:p>
+          <a:p>
+            <a:r>
+              <a:rPr lang="de-CH" dirty="0" smtClean="0"/>
+              <a:t>Version 3.0 ab Januar 2019</a:t>
+            </a:r>
+            <a:endParaRPr lang="de-CH" dirty="0"/>
+          </a:p>
+        </p:txBody>
+      </p:sp>
+      <p:sp>
+        <p:nvSpPr>
+          <p:cNvPr id="5" name="Rechteck 4"/>
+          <p:cNvSpPr/>
+          <p:nvPr/>
+        </p:nvSpPr>
+        <p:spPr>
+          <a:xfrm rot="20807413">
+            <a:off x="7912257" y="5261644"/>
+            <a:ext cx="3161122" cy="477054"/>
+          </a:xfrm>
+          <a:prstGeom prst="rect">
+            <a:avLst/>
+          </a:prstGeom>
+        </p:spPr>
+        <p:txBody>
+          <a:bodyPr wrap="none">
+            <a:spAutoFit/>
+          </a:bodyPr>
+          <a:lstStyle/>
+          <a:p>
+            <a:r>
+              <a:rPr lang="de-DE" sz="2500" dirty="0">
+                <a:latin typeface="Marker Felt Thin" charset="0"/>
+                <a:ea typeface="Marker Felt Thin" charset="0"/>
+                <a:cs typeface="Marker Felt Thin" charset="0"/>
+                <a:hlinkClick r:id="rId2"/>
+              </a:rPr>
+              <a:t>https://scratch.mit.edu</a:t>
+            </a:r>
+            <a:endParaRPr lang="de-DE" sz="2500" dirty="0">
+              <a:latin typeface="Marker Felt Thin" charset="0"/>
+              <a:ea typeface="Marker Felt Thin" charset="0"/>
+              <a:cs typeface="Marker Felt Thin" charset="0"/>
+            </a:endParaRPr>
+          </a:p>
+        </p:txBody>
+      </p:sp>
+      <p:pic>
+        <p:nvPicPr>
+          <p:cNvPr id="7" name="Bild 6"/>
+          <p:cNvPicPr>
+            <a:picLocks noChangeAspect="1"/>
+          </p:cNvPicPr>
+          <p:nvPr/>
+        </p:nvPicPr>
+        <p:blipFill>
+          <a:blip r:embed="rId3">
+            <a:extLst>
+              <a:ext uri="{28A0092B-C50C-407E-A947-70E740481C1C}">
+                <a14:useLocalDpi xmlns:a14="http://schemas.microsoft.com/office/drawing/2010/main" val="0"/>
+              </a:ext>
+            </a:extLst>
+          </a:blip>
+          <a:stretch>
+            <a:fillRect/>
+          </a:stretch>
+        </p:blipFill>
+        <p:spPr>
+          <a:xfrm>
+            <a:off x="7980974" y="2636545"/>
+            <a:ext cx="2159306" cy="2388076"/>
+          </a:xfrm>
+          <a:prstGeom prst="rect">
+            <a:avLst/>
+          </a:prstGeom>
+        </p:spPr>
+      </p:pic>
     </p:spTree>
     <p:extLst>
       <p:ext uri="{BB962C8B-B14F-4D97-AF65-F5344CB8AC3E}">
@@ -3170,10 +3682,118 @@
           <a:bodyPr/>
           <a:lstStyle/>
           <a:p>
-            <a:endParaRPr lang="de-CH"/>
-          </a:p>
-        </p:txBody>
-      </p:sp>
+            <a:r>
+              <a:rPr lang="de-CH" dirty="0"/>
+              <a:t>v</a:t>
+            </a:r>
+            <a:r>
+              <a:rPr lang="de-CH" dirty="0" smtClean="0"/>
+              <a:t>erschiedene Farben = Kategorien</a:t>
+            </a:r>
+          </a:p>
+          <a:p>
+            <a:r>
+              <a:rPr lang="de-CH" dirty="0"/>
+              <a:t>v</a:t>
+            </a:r>
+            <a:r>
+              <a:rPr lang="de-CH" dirty="0" smtClean="0"/>
+              <a:t>erschiedene Formen = Syntax</a:t>
+            </a:r>
+            <a:endParaRPr lang="de-CH" dirty="0"/>
+          </a:p>
+        </p:txBody>
+      </p:sp>
+      <p:pic>
+        <p:nvPicPr>
+          <p:cNvPr id="8" name="Bild 7"/>
+          <p:cNvPicPr>
+            <a:picLocks noChangeAspect="1"/>
+          </p:cNvPicPr>
+          <p:nvPr/>
+        </p:nvPicPr>
+        <p:blipFill>
+          <a:blip r:embed="rId2">
+            <a:extLst>
+              <a:ext uri="{28A0092B-C50C-407E-A947-70E740481C1C}">
+                <a14:useLocalDpi xmlns:a14="http://schemas.microsoft.com/office/drawing/2010/main" val="0"/>
+              </a:ext>
+            </a:extLst>
+          </a:blip>
+          <a:stretch>
+            <a:fillRect/>
+          </a:stretch>
+        </p:blipFill>
+        <p:spPr>
+          <a:xfrm>
+            <a:off x="7012638" y="1825587"/>
+            <a:ext cx="4341162" cy="4351376"/>
+          </a:xfrm>
+          <a:prstGeom prst="rect">
+            <a:avLst/>
+          </a:prstGeom>
+        </p:spPr>
+      </p:pic>
+      <p:pic>
+        <p:nvPicPr>
+          <p:cNvPr id="9" name="Bild 8"/>
+          <p:cNvPicPr>
+            <a:picLocks noChangeAspect="1"/>
+          </p:cNvPicPr>
+          <p:nvPr/>
+        </p:nvPicPr>
+        <p:blipFill>
+          <a:blip r:embed="rId3">
+            <a:extLst>
+              <a:ext uri="{28A0092B-C50C-407E-A947-70E740481C1C}">
+                <a14:useLocalDpi xmlns:a14="http://schemas.microsoft.com/office/drawing/2010/main" val="0"/>
+              </a:ext>
+            </a:extLst>
+          </a:blip>
+          <a:stretch>
+            <a:fillRect/>
+          </a:stretch>
+        </p:blipFill>
+        <p:spPr>
+          <a:xfrm>
+            <a:off x="2434728" y="3203614"/>
+            <a:ext cx="3661272" cy="2973350"/>
+          </a:xfrm>
+          <a:prstGeom prst="rect">
+            <a:avLst/>
+          </a:prstGeom>
+        </p:spPr>
+      </p:pic>
+      <p:pic>
+        <p:nvPicPr>
+          <p:cNvPr id="10" name="Bild 9"/>
+          <p:cNvPicPr>
+            <a:picLocks noChangeAspect="1"/>
+          </p:cNvPicPr>
+          <p:nvPr/>
+        </p:nvPicPr>
+        <p:blipFill>
+          <a:blip r:embed="rId4">
+            <a:extLst>
+              <a:ext uri="{28A0092B-C50C-407E-A947-70E740481C1C}">
+                <a14:useLocalDpi xmlns:a14="http://schemas.microsoft.com/office/drawing/2010/main" val="0"/>
+              </a:ext>
+            </a:extLst>
+          </a:blip>
+          <a:stretch>
+            <a:fillRect/>
+          </a:stretch>
+        </p:blipFill>
+        <p:spPr>
+          <a:xfrm>
+            <a:off x="10047477" y="471554"/>
+            <a:ext cx="1006111" cy="1112704"/>
+          </a:xfrm>
+          <a:prstGeom prst="rect">
+            <a:avLst/>
+          </a:prstGeom>
+        </p:spPr>
+      </p:pic>
     </p:spTree>
     <p:extLst>
       <p:ext uri="{BB962C8B-B14F-4D97-AF65-F5344CB8AC3E}">
@@ -3246,7 +3866,187 @@
           <a:bodyPr/>
           <a:lstStyle/>
           <a:p>
-            <a:endParaRPr lang="de-CH"/>
+            <a:r>
+              <a:rPr lang="de-CH" dirty="0" smtClean="0"/>
+              <a:t>Broadcast einer Nachricht</a:t>
+            </a:r>
+          </a:p>
+          <a:p>
+            <a:r>
+              <a:rPr lang="de-CH" dirty="0" smtClean="0"/>
+              <a:t>Nachrichten empfangen und darauf reagieren</a:t>
+            </a:r>
+          </a:p>
+          <a:p>
+            <a:r>
+              <a:rPr lang="de-CH" dirty="0" smtClean="0"/>
+              <a:t>Mehrere Figuren können Nachrichten empfangen </a:t>
+            </a:r>
+            <a:r>
+              <a:rPr lang="de-CH" dirty="0" smtClean="0">
+                <a:sym typeface="Wingdings"/>
+              </a:rPr>
+              <a:t> Nebenläufigkeit</a:t>
+            </a:r>
+            <a:endParaRPr lang="de-CH" dirty="0"/>
+          </a:p>
+        </p:txBody>
+      </p:sp>
+      <p:pic>
+        <p:nvPicPr>
+          <p:cNvPr id="4" name="Bild 3"/>
+          <p:cNvPicPr>
+            <a:picLocks noChangeAspect="1"/>
+          </p:cNvPicPr>
+          <p:nvPr/>
+        </p:nvPicPr>
+        <p:blipFill>
+          <a:blip r:embed="rId2">
+            <a:extLst>
+              <a:ext uri="{28A0092B-C50C-407E-A947-70E740481C1C}">
+                <a14:useLocalDpi xmlns:a14="http://schemas.microsoft.com/office/drawing/2010/main" val="0"/>
+              </a:ext>
+            </a:extLst>
+          </a:blip>
+          <a:stretch>
+            <a:fillRect/>
+          </a:stretch>
+        </p:blipFill>
+        <p:spPr>
+          <a:xfrm>
+            <a:off x="3128884" y="4735082"/>
+            <a:ext cx="1006111" cy="1112704"/>
+          </a:xfrm>
+          <a:prstGeom prst="rect">
+            <a:avLst/>
+          </a:prstGeom>
+        </p:spPr>
+      </p:pic>
+      <p:pic>
+        <p:nvPicPr>
+          <p:cNvPr id="5" name="Bild 4"/>
+          <p:cNvPicPr>
+            <a:picLocks noChangeAspect="1"/>
+          </p:cNvPicPr>
+          <p:nvPr/>
+        </p:nvPicPr>
+        <p:blipFill>
+          <a:blip r:embed="rId2">
+            <a:extLst>
+              <a:ext uri="{28A0092B-C50C-407E-A947-70E740481C1C}">
+                <a14:useLocalDpi xmlns:a14="http://schemas.microsoft.com/office/drawing/2010/main" val="0"/>
+              </a:ext>
+            </a:extLst>
+          </a:blip>
+          <a:stretch>
+            <a:fillRect/>
+          </a:stretch>
+        </p:blipFill>
+        <p:spPr>
+          <a:xfrm flipH="1">
+            <a:off x="6738286" y="4787996"/>
+            <a:ext cx="1006111" cy="1112704"/>
+          </a:xfrm>
+          <a:prstGeom prst="rect">
+            <a:avLst/>
+          </a:prstGeom>
+        </p:spPr>
+      </p:pic>
+      <p:sp>
+        <p:nvSpPr>
+          <p:cNvPr id="6" name="Abgerundete rechteckige Legende 5"/>
+          <p:cNvSpPr/>
+          <p:nvPr/>
+        </p:nvSpPr>
+        <p:spPr>
+          <a:xfrm>
+            <a:off x="4134995" y="3956384"/>
+            <a:ext cx="947450" cy="449521"/>
+          </a:xfrm>
+          <a:prstGeom prst="wedgeRoundRectCallout">
+            <a:avLst>
+              <a:gd name="adj1" fmla="val -49677"/>
+              <a:gd name="adj2" fmla="val 136024"/>
+              <a:gd name="adj3" fmla="val 16667"/>
+            </a:avLst>
+          </a:prstGeom>
+        </p:spPr>
+        <p:style>
+          <a:lnRef idx="2">
+            <a:schemeClr val="dk1"/>
+          </a:lnRef>
+          <a:fillRef idx="1">
+            <a:schemeClr val="lt1"/>
+          </a:fillRef>
+          <a:effectRef idx="0">
+            <a:schemeClr val="dk1"/>
+          </a:effectRef>
+          <a:fontRef idx="minor">
+            <a:schemeClr val="dk1"/>
+          </a:fontRef>
+        </p:style>
+        <p:txBody>
+          <a:bodyPr rtlCol="0" anchor="ctr"/>
+          <a:lstStyle/>
+          <a:p>
+            <a:pPr algn="ctr"/>
+            <a:r>
+              <a:rPr lang="de-CH" dirty="0" err="1" smtClean="0"/>
+              <a:t>Hello</a:t>
+            </a:r>
+            <a:r>
+              <a:rPr lang="de-CH" dirty="0" smtClean="0"/>
+              <a:t>!</a:t>
+            </a:r>
+          </a:p>
+        </p:txBody>
+      </p:sp>
+      <p:sp>
+        <p:nvSpPr>
+          <p:cNvPr id="7" name="Abgerundete rechteckige Legende 6"/>
+          <p:cNvSpPr/>
+          <p:nvPr/>
+        </p:nvSpPr>
+        <p:spPr>
+          <a:xfrm>
+            <a:off x="5478229" y="4563235"/>
+            <a:ext cx="947450" cy="449521"/>
+          </a:xfrm>
+          <a:prstGeom prst="wedgeRoundRectCallout">
+            <a:avLst>
+              <a:gd name="adj1" fmla="val 50323"/>
+              <a:gd name="adj2" fmla="val 84557"/>
+              <a:gd name="adj3" fmla="val 16667"/>
+            </a:avLst>
+          </a:prstGeom>
+        </p:spPr>
+        <p:style>
+          <a:lnRef idx="2">
+            <a:schemeClr val="dk1"/>
+          </a:lnRef>
+          <a:fillRef idx="1">
+            <a:schemeClr val="lt1"/>
+          </a:fillRef>
+          <a:effectRef idx="0">
+            <a:schemeClr val="dk1"/>
+          </a:effectRef>
+          <a:fontRef idx="minor">
+            <a:schemeClr val="dk1"/>
+          </a:fontRef>
+        </p:style>
+        <p:txBody>
+          <a:bodyPr rtlCol="0" anchor="ctr"/>
+          <a:lstStyle/>
+          <a:p>
+            <a:pPr algn="ctr"/>
+            <a:r>
+              <a:rPr lang="de-CH" dirty="0" err="1" smtClean="0"/>
+              <a:t>Hello</a:t>
+            </a:r>
+            <a:r>
+              <a:rPr lang="de-CH" dirty="0" smtClean="0"/>
+              <a:t>!</a:t>
+            </a:r>
           </a:p>
         </p:txBody>
       </p:sp>
@@ -3322,10 +4122,281 @@
           <a:bodyPr/>
           <a:lstStyle/>
           <a:p>
-            <a:endParaRPr lang="de-CH"/>
-          </a:p>
-        </p:txBody>
-      </p:sp>
+            <a:r>
+              <a:rPr lang="de-CH" dirty="0" smtClean="0"/>
+              <a:t>Keine Klassen oder Vererbung</a:t>
+            </a:r>
+          </a:p>
+          <a:p>
+            <a:r>
+              <a:rPr lang="de-CH" dirty="0" smtClean="0"/>
+              <a:t>Figuren sind fertige Instanzen</a:t>
+            </a:r>
+          </a:p>
+          <a:p>
+            <a:r>
+              <a:rPr lang="de-CH" dirty="0" smtClean="0"/>
+              <a:t>Zur Laufzeit kann Figur geklont werden</a:t>
+            </a:r>
+            <a:endParaRPr lang="de-CH" dirty="0"/>
+          </a:p>
+        </p:txBody>
+      </p:sp>
+      <p:grpSp>
+        <p:nvGrpSpPr>
+          <p:cNvPr id="15" name="Gruppierung 14"/>
+          <p:cNvGrpSpPr/>
+          <p:nvPr/>
+        </p:nvGrpSpPr>
+        <p:grpSpPr>
+          <a:xfrm>
+            <a:off x="8703325" y="2243936"/>
+            <a:ext cx="2650475" cy="2786767"/>
+            <a:chOff x="9280889" y="2564760"/>
+            <a:chExt cx="2072911" cy="2179504"/>
+          </a:xfrm>
+        </p:grpSpPr>
+        <p:pic>
+          <p:nvPicPr>
+            <p:cNvPr id="5" name="Bild 4"/>
+            <p:cNvPicPr>
+              <a:picLocks noChangeAspect="1"/>
+            </p:cNvPicPr>
+            <p:nvPr/>
+          </p:nvPicPr>
+          <p:blipFill>
+            <a:blip r:embed="rId2">
+              <a:extLst>
+                <a:ext uri="{28A0092B-C50C-407E-A947-70E740481C1C}">
+                  <a14:useLocalDpi xmlns:a14="http://schemas.microsoft.com/office/drawing/2010/main" val="0"/>
+                </a:ext>
+              </a:extLst>
+            </a:blip>
+            <a:stretch>
+              <a:fillRect/>
+            </a:stretch>
+          </p:blipFill>
+          <p:spPr>
+            <a:xfrm>
+              <a:off x="9280889" y="2564760"/>
+              <a:ext cx="1006111" cy="1112704"/>
+            </a:xfrm>
+            <a:prstGeom prst="rect">
+              <a:avLst/>
+            </a:prstGeom>
+          </p:spPr>
+        </p:pic>
+        <p:pic>
+          <p:nvPicPr>
+            <p:cNvPr id="8" name="Bild 7"/>
+            <p:cNvPicPr>
+              <a:picLocks noChangeAspect="1"/>
+            </p:cNvPicPr>
+            <p:nvPr/>
+          </p:nvPicPr>
+          <p:blipFill>
+            <a:blip r:embed="rId2">
+              <a:extLst>
+                <a:ext uri="{28A0092B-C50C-407E-A947-70E740481C1C}">
+                  <a14:useLocalDpi xmlns:a14="http://schemas.microsoft.com/office/drawing/2010/main" val="0"/>
+                </a:ext>
+              </a:extLst>
+            </a:blip>
+            <a:stretch>
+              <a:fillRect/>
+            </a:stretch>
+          </p:blipFill>
+          <p:spPr>
+            <a:xfrm>
+              <a:off x="9433289" y="2717160"/>
+              <a:ext cx="1006111" cy="1112704"/>
+            </a:xfrm>
+            <a:prstGeom prst="rect">
+              <a:avLst/>
+            </a:prstGeom>
+          </p:spPr>
+        </p:pic>
+        <p:pic>
+          <p:nvPicPr>
+            <p:cNvPr id="9" name="Bild 8"/>
+            <p:cNvPicPr>
+              <a:picLocks noChangeAspect="1"/>
+            </p:cNvPicPr>
+            <p:nvPr/>
+          </p:nvPicPr>
+          <p:blipFill>
+            <a:blip r:embed="rId2">
+              <a:extLst>
+                <a:ext uri="{28A0092B-C50C-407E-A947-70E740481C1C}">
+                  <a14:useLocalDpi xmlns:a14="http://schemas.microsoft.com/office/drawing/2010/main" val="0"/>
+                </a:ext>
+              </a:extLst>
+            </a:blip>
+            <a:stretch>
+              <a:fillRect/>
+            </a:stretch>
+          </p:blipFill>
+          <p:spPr>
+            <a:xfrm>
+              <a:off x="9585689" y="2869560"/>
+              <a:ext cx="1006111" cy="1112704"/>
+            </a:xfrm>
+            <a:prstGeom prst="rect">
+              <a:avLst/>
+            </a:prstGeom>
+          </p:spPr>
+        </p:pic>
+        <p:pic>
+          <p:nvPicPr>
+            <p:cNvPr id="10" name="Bild 9"/>
+            <p:cNvPicPr>
+              <a:picLocks noChangeAspect="1"/>
+            </p:cNvPicPr>
+            <p:nvPr/>
+          </p:nvPicPr>
+          <p:blipFill>
+            <a:blip r:embed="rId2">
+              <a:extLst>
+                <a:ext uri="{28A0092B-C50C-407E-A947-70E740481C1C}">
+                  <a14:useLocalDpi xmlns:a14="http://schemas.microsoft.com/office/drawing/2010/main" val="0"/>
+                </a:ext>
+              </a:extLst>
+            </a:blip>
+            <a:stretch>
+              <a:fillRect/>
+            </a:stretch>
+          </p:blipFill>
+          <p:spPr>
+            <a:xfrm>
+              <a:off x="9738089" y="3021960"/>
+              <a:ext cx="1006111" cy="1112704"/>
+            </a:xfrm>
+            <a:prstGeom prst="rect">
+              <a:avLst/>
+            </a:prstGeom>
+          </p:spPr>
+        </p:pic>
+        <p:pic>
+          <p:nvPicPr>
+            <p:cNvPr id="11" name="Bild 10"/>
+            <p:cNvPicPr>
+              <a:picLocks noChangeAspect="1"/>
+            </p:cNvPicPr>
+            <p:nvPr/>
+          </p:nvPicPr>
+          <p:blipFill>
+            <a:blip r:embed="rId2">
+              <a:extLst>
+                <a:ext uri="{28A0092B-C50C-407E-A947-70E740481C1C}">
+                  <a14:useLocalDpi xmlns:a14="http://schemas.microsoft.com/office/drawing/2010/main" val="0"/>
+                </a:ext>
+              </a:extLst>
+            </a:blip>
+            <a:stretch>
+              <a:fillRect/>
+            </a:stretch>
+          </p:blipFill>
+          <p:spPr>
+            <a:xfrm>
+              <a:off x="9890489" y="3174360"/>
+              <a:ext cx="1006111" cy="1112704"/>
+            </a:xfrm>
+            <a:prstGeom prst="rect">
+              <a:avLst/>
+            </a:prstGeom>
+          </p:spPr>
+        </p:pic>
+        <p:pic>
+          <p:nvPicPr>
+            <p:cNvPr id="12" name="Bild 11"/>
+            <p:cNvPicPr>
+              <a:picLocks noChangeAspect="1"/>
+            </p:cNvPicPr>
+            <p:nvPr/>
+          </p:nvPicPr>
+          <p:blipFill>
+            <a:blip r:embed="rId2">
+              <a:extLst>
+                <a:ext uri="{28A0092B-C50C-407E-A947-70E740481C1C}">
+                  <a14:useLocalDpi xmlns:a14="http://schemas.microsoft.com/office/drawing/2010/main" val="0"/>
+                </a:ext>
+              </a:extLst>
+            </a:blip>
+            <a:stretch>
+              <a:fillRect/>
+            </a:stretch>
+          </p:blipFill>
+          <p:spPr>
+            <a:xfrm>
+              <a:off x="10042889" y="3326760"/>
+              <a:ext cx="1006111" cy="1112704"/>
+            </a:xfrm>
+            <a:prstGeom prst="rect">
+              <a:avLst/>
+            </a:prstGeom>
+          </p:spPr>
+        </p:pic>
+        <p:pic>
+          <p:nvPicPr>
+            <p:cNvPr id="13" name="Bild 12"/>
+            <p:cNvPicPr>
+              <a:picLocks noChangeAspect="1"/>
+            </p:cNvPicPr>
+            <p:nvPr/>
+          </p:nvPicPr>
+          <p:blipFill>
+            <a:blip r:embed="rId2">
+              <a:extLst>
+                <a:ext uri="{28A0092B-C50C-407E-A947-70E740481C1C}">
+                  <a14:useLocalDpi xmlns:a14="http://schemas.microsoft.com/office/drawing/2010/main" val="0"/>
+                </a:ext>
+              </a:extLst>
+            </a:blip>
+            <a:stretch>
+              <a:fillRect/>
+            </a:stretch>
+          </p:blipFill>
+          <p:spPr>
+            <a:xfrm>
+              <a:off x="10195289" y="3479160"/>
+              <a:ext cx="1006111" cy="1112704"/>
+            </a:xfrm>
+            <a:prstGeom prst="rect">
+              <a:avLst/>
+            </a:prstGeom>
+          </p:spPr>
+        </p:pic>
+        <p:pic>
+          <p:nvPicPr>
+            <p:cNvPr id="14" name="Bild 13"/>
+            <p:cNvPicPr>
+              <a:picLocks noChangeAspect="1"/>
+            </p:cNvPicPr>
+            <p:nvPr/>
+          </p:nvPicPr>
+          <p:blipFill>
+            <a:blip r:embed="rId2">
+              <a:extLst>
+                <a:ext uri="{28A0092B-C50C-407E-A947-70E740481C1C}">
+                  <a14:useLocalDpi xmlns:a14="http://schemas.microsoft.com/office/drawing/2010/main" val="0"/>
+                </a:ext>
+              </a:extLst>
+            </a:blip>
+            <a:stretch>
+              <a:fillRect/>
+            </a:stretch>
+          </p:blipFill>
+          <p:spPr>
+            <a:xfrm>
+              <a:off x="10347689" y="3631560"/>
+              <a:ext cx="1006111" cy="1112704"/>
+            </a:xfrm>
+            <a:prstGeom prst="rect">
+              <a:avLst/>
+            </a:prstGeom>
+          </p:spPr>
+        </p:pic>
+      </p:grpSp>
     </p:spTree>
     <p:extLst>
       <p:ext uri="{BB962C8B-B14F-4D97-AF65-F5344CB8AC3E}">
@@ -3395,28 +4466,55 @@
           <a:lstStyle/>
           <a:p>
             <a:r>
+              <a:rPr lang="de-CH" dirty="0" err="1" smtClean="0"/>
+              <a:t>Scratch</a:t>
+            </a:r>
+            <a:r>
               <a:rPr lang="de-CH" dirty="0" smtClean="0"/>
-              <a:t>"Gute" Sprache? </a:t>
-            </a:r>
-          </a:p>
-          <a:p>
+              <a:t> schafft was es verspricht:</a:t>
+            </a:r>
+          </a:p>
+          <a:p>
+            <a:pPr lvl="1"/>
             <a:r>
               <a:rPr lang="de-CH" dirty="0" smtClean="0"/>
-              <a:t>Würden Sie sie regelmässig einsetzten wollen? </a:t>
-            </a:r>
-          </a:p>
-          <a:p>
+              <a:t>Einsteigerfreundlich</a:t>
+            </a:r>
+          </a:p>
+          <a:p>
+            <a:pPr lvl="1"/>
             <a:r>
               <a:rPr lang="de-CH" dirty="0" smtClean="0"/>
-              <a:t>Falls Ja: für was? </a:t>
+              <a:t>Lehr-Sprache</a:t>
             </a:r>
           </a:p>
           <a:p>
             <a:r>
               <a:rPr lang="de-CH" dirty="0" smtClean="0"/>
-              <a:t>Falls Nein: Wieso nicht?</a:t>
-            </a:r>
-            <a:endParaRPr lang="de-CH" dirty="0"/>
+              <a:t>Keine Syntaxfehler möglich</a:t>
+            </a:r>
+          </a:p>
+          <a:p>
+            <a:r>
+              <a:rPr lang="de-CH" dirty="0" smtClean="0"/>
+              <a:t>Exzessives Drag und Drop</a:t>
+            </a:r>
+          </a:p>
+          <a:p>
+            <a:r>
+              <a:rPr lang="de-CH" dirty="0" smtClean="0"/>
+              <a:t>Zum schnellen Bau von Prototypen allenfalls nützlich</a:t>
+            </a:r>
+          </a:p>
+          <a:p>
+            <a:r>
+              <a:rPr lang="de-CH" dirty="0" smtClean="0"/>
+              <a:t>Als Lehrer: Top Werkzeug!</a:t>
+            </a:r>
+            <a:endParaRPr lang="de-CH" dirty="0" smtClean="0"/>
+          </a:p>
+          <a:p>
+            <a:endParaRPr lang="de-CH" dirty="0" smtClean="0"/>
           </a:p>
         </p:txBody>
       </p:sp>
@@ -3471,11 +4569,7 @@
             </a:r>
             <a:r>
               <a:rPr lang="de-CH" smtClean="0"/>
-              <a:t>Fazit </a:t>
-            </a:r>
-            <a:r>
-              <a:rPr lang="de-CH" smtClean="0"/>
-              <a:t>Lu</a:t>
+              <a:t>Fazit Lu</a:t>
             </a:r>
             <a:r>
               <a:rPr lang="de-CH"/>
@@ -3508,7 +4602,47 @@
           <a:bodyPr/>
           <a:lstStyle/>
           <a:p>
-            <a:endParaRPr lang="de-CH"/>
+            <a:r>
+              <a:rPr lang="de-CH" dirty="0" smtClean="0"/>
+              <a:t>Überrascht und beeindruckt von Umfang und Möglichkeiten</a:t>
+            </a:r>
+          </a:p>
+          <a:p>
+            <a:r>
+              <a:rPr lang="de-CH" dirty="0" smtClean="0"/>
+              <a:t>Broadcast Prinzip ist interessant:</a:t>
+            </a:r>
+          </a:p>
+          <a:p>
+            <a:pPr lvl="1"/>
+            <a:r>
+              <a:rPr lang="de-CH" dirty="0" smtClean="0"/>
+              <a:t>Starke Trennung von Komponenten</a:t>
+            </a:r>
+          </a:p>
+          <a:p>
+            <a:pPr lvl="1"/>
+            <a:r>
+              <a:rPr lang="de-CH" dirty="0" smtClean="0"/>
+              <a:t>Sehr einfache Parallelisierung</a:t>
+            </a:r>
+          </a:p>
+          <a:p>
+            <a:r>
+              <a:rPr lang="de-CH" dirty="0" smtClean="0"/>
+              <a:t>„</a:t>
+            </a:r>
+            <a:r>
+              <a:rPr lang="de-CH" dirty="0" err="1" smtClean="0"/>
+              <a:t>Klickerei</a:t>
+            </a:r>
+            <a:r>
+              <a:rPr lang="de-CH" dirty="0" smtClean="0"/>
+              <a:t>“ durch Drag und Drop mühsam</a:t>
+            </a:r>
+          </a:p>
+          <a:p>
+            <a:endParaRPr lang="de-CH" dirty="0"/>
           </a:p>
         </p:txBody>
       </p:sp>
@@ -3856,4 +4990,265 @@
     </a:ext>
   </a:extLst>
 </a:theme>
+</file>
+
+<file path=ppt/theme/theme2.xml><?xml version="1.0" encoding="utf-8"?>
+<a:theme xmlns:a="http://schemas.openxmlformats.org/drawingml/2006/main" name="Office-Design">
+  <a:themeElements>
+    <a:clrScheme name="Office">
+      <a:dk1>
+        <a:sysClr val="windowText" lastClr="000000"/>
+      </a:dk1>
+      <a:lt1>
+        <a:sysClr val="window" lastClr="FFFFFF"/>
+      </a:lt1>
+      <a:dk2>
+        <a:srgbClr val="44546A"/>
+      </a:dk2>
+      <a:lt2>
+        <a:srgbClr val="E7E6E6"/>
+      </a:lt2>
+      <a:accent1>
+        <a:srgbClr val="4472C4"/>
+      </a:accent1>
+      <a:accent2>
+        <a:srgbClr val="ED7D31"/>
+      </a:accent2>
+      <a:accent3>
+        <a:srgbClr val="A5A5A5"/>
+      </a:accent3>
+      <a:accent4>
+        <a:srgbClr val="FFC000"/>
+      </a:accent4>
+      <a:accent5>
+        <a:srgbClr val="5B9BD5"/>
+      </a:accent5>
+      <a:accent6>
+        <a:srgbClr val="70AD47"/>
+      </a:accent6>
+      <a:hlink>
+        <a:srgbClr val="0563C1"/>
+      </a:hlink>
+      <a:folHlink>
+        <a:srgbClr val="954F72"/>
+      </a:folHlink>
+    </a:clrScheme>
+    <a:fontScheme name="Office">
+      <a:majorFont>
+        <a:latin typeface="Calibri Light" panose="020F0302020204030204"/>
+        <a:ea typeface=""/>
+        <a:cs typeface=""/>
+        <a:font script="Jpan" typeface="Yu Gothic Light"/>
+        <a:font script="Hang" typeface="맑은 고딕"/>
+        <a:font script="Hans" typeface="DengXian Light"/>
+        <a:font script="Hant" typeface="新細明體"/>
+        <a:font script="Arab" typeface="Times New Roman"/>
+        <a:font script="Hebr" typeface="Times New Roman"/>
+        <a:font script="Thai" typeface="Angsana New"/>
+        <a:font script="Ethi" typeface="Nyala"/>
+        <a:font script="Beng" typeface="Vrinda"/>
+        <a:font script="Gujr" typeface="Shruti"/>
+        <a:font script="Khmr" typeface="MoolBoran"/>
+        <a:font script="Knda" typeface="Tunga"/>
+        <a:font script="Guru" typeface="Raavi"/>
+        <a:font script="Cans" typeface="Euphemia"/>
+        <a:font script="Cher" typeface="Plantagenet Cherokee"/>
+        <a:font script="Yiii" typeface="Microsoft Yi Baiti"/>
+        <a:font script="Tibt" typeface="Microsoft Himalaya"/>
+        <a:font script="Thaa" typeface="MV Boli"/>
+        <a:font script="Deva" typeface="Mangal"/>
+        <a:font script="Telu" typeface="Gautami"/>
+        <a:font script="Taml" typeface="Latha"/>
+        <a:font script="Syrc" typeface="Estrangelo Edessa"/>
+        <a:font script="Orya" typeface="Kalinga"/>
+        <a:font script="Mlym" typeface="Kartika"/>
+        <a:font script="Laoo" typeface="DokChampa"/>
+        <a:font script="Sinh" typeface="Iskoola Pota"/>
+        <a:font script="Mong" typeface="Mongolian Baiti"/>
+        <a:font script="Viet" typeface="Times New Roman"/>
+        <a:font script="Uigh" typeface="Microsoft Uighur"/>
+        <a:font script="Geor" typeface="Sylfaen"/>
+      </a:majorFont>
+      <a:minorFont>
+        <a:latin typeface="Calibri" panose="020F0502020204030204"/>
+        <a:ea typeface=""/>
+        <a:cs typeface=""/>
+        <a:font script="Jpan" typeface="Yu Gothic"/>
+        <a:font script="Hang" typeface="맑은 고딕"/>
+        <a:font script="Hans" typeface="DengXian"/>
+        <a:font script="Hant" typeface="新細明體"/>
+        <a:font script="Arab" typeface="Arial"/>
+        <a:font script="Hebr" typeface="Arial"/>
+        <a:font script="Thai" typeface="Cordia New"/>
+        <a:font script="Ethi" typeface="Nyala"/>
+        <a:font script="Beng" typeface="Vrinda"/>
+        <a:font script="Gujr" typeface="Shruti"/>
+        <a:font script="Khmr" typeface="DaunPenh"/>
+        <a:font script="Knda" typeface="Tunga"/>
+        <a:font script="Guru" typeface="Raavi"/>
+        <a:font script="Cans" typeface="Euphemia"/>
+        <a:font script="Cher" typeface="Plantagenet Cherokee"/>
+        <a:font script="Yiii" typeface="Microsoft Yi Baiti"/>
+        <a:font script="Tibt" typeface="Microsoft Himalaya"/>
+        <a:font script="Thaa" typeface="MV Boli"/>
+        <a:font script="Deva" typeface="Mangal"/>
+        <a:font script="Telu" typeface="Gautami"/>
+        <a:font script="Taml" typeface="Latha"/>
+        <a:font script="Syrc" typeface="Estrangelo Edessa"/>
+        <a:font script="Orya" typeface="Kalinga"/>
+        <a:font script="Mlym" typeface="Kartika"/>
+        <a:font script="Laoo" typeface="DokChampa"/>
+        <a:font script="Sinh" typeface="Iskoola Pota"/>
+        <a:font script="Mong" typeface="Mongolian Baiti"/>
+        <a:font script="Viet" typeface="Arial"/>
+        <a:font script="Uigh" typeface="Microsoft Uighur"/>
+        <a:font script="Geor" typeface="Sylfaen"/>
+      </a:minorFont>
+    </a:fontScheme>
+    <a:fmtScheme name="Office">
+      <a:fillStyleLst>
+        <a:solidFill>
+          <a:schemeClr val="phClr"/>
+        </a:solidFill>
+        <a:gradFill rotWithShape="1">
+          <a:gsLst>
+            <a:gs pos="0">
+              <a:schemeClr val="phClr">
+                <a:lumMod val="110000"/>
+                <a:satMod val="105000"/>
+                <a:tint val="67000"/>
+              </a:schemeClr>
+            </a:gs>
+            <a:gs pos="50000">
+              <a:schemeClr val="phClr">
+                <a:lumMod val="105000"/>
+                <a:satMod val="103000"/>
+                <a:tint val="73000"/>
+              </a:schemeClr>
+            </a:gs>
+            <a:gs pos="100000">
+              <a:schemeClr val="phClr">
+                <a:lumMod val="105000"/>
+                <a:satMod val="109000"/>
+                <a:tint val="81000"/>
+              </a:schemeClr>
+            </a:gs>
+          </a:gsLst>
+          <a:lin ang="5400000" scaled="0"/>
+        </a:gradFill>
+        <a:gradFill rotWithShape="1">
+          <a:gsLst>
+            <a:gs pos="0">
+              <a:schemeClr val="phClr">
+                <a:satMod val="103000"/>
+                <a:lumMod val="102000"/>
+                <a:tint val="94000"/>
+              </a:schemeClr>
+            </a:gs>
+            <a:gs pos="50000">
+              <a:schemeClr val="phClr">
+                <a:satMod val="110000"/>
+                <a:lumMod val="100000"/>
+                <a:shade val="100000"/>
+              </a:schemeClr>
+            </a:gs>
+            <a:gs pos="100000">
+              <a:schemeClr val="phClr">
+                <a:lumMod val="99000"/>
+                <a:satMod val="120000"/>
+                <a:shade val="78000"/>
+              </a:schemeClr>
+            </a:gs>
+          </a:gsLst>
+          <a:lin ang="5400000" scaled="0"/>
+        </a:gradFill>
+      </a:fillStyleLst>
+      <a:lnStyleLst>
+        <a:ln w="6350" cap="flat" cmpd="sng" algn="ctr">
+          <a:solidFill>
+            <a:schemeClr val="phClr"/>
+          </a:solidFill>
+          <a:prstDash val="solid"/>
+          <a:miter lim="800000"/>
+        </a:ln>
+        <a:ln w="12700" cap="flat" cmpd="sng" algn="ctr">
+          <a:solidFill>
+            <a:schemeClr val="phClr"/>
+          </a:solidFill>
+          <a:prstDash val="solid"/>
+          <a:miter lim="800000"/>
+        </a:ln>
+        <a:ln w="19050" cap="flat" cmpd="sng" algn="ctr">
+          <a:solidFill>
+            <a:schemeClr val="phClr"/>
+          </a:solidFill>
+          <a:prstDash val="solid"/>
+          <a:miter lim="800000"/>
+        </a:ln>
+      </a:lnStyleLst>
+      <a:effectStyleLst>
+        <a:effectStyle>
+          <a:effectLst/>
+        </a:effectStyle>
+        <a:effectStyle>
+          <a:effectLst/>
+        </a:effectStyle>
+        <a:effectStyle>
+          <a:effectLst>
+            <a:outerShdw blurRad="57150" dist="19050" dir="5400000" algn="ctr" rotWithShape="0">
+              <a:srgbClr val="000000">
+                <a:alpha val="63000"/>
+              </a:srgbClr>
+            </a:outerShdw>
+          </a:effectLst>
+        </a:effectStyle>
+      </a:effectStyleLst>
+      <a:bgFillStyleLst>
+        <a:solidFill>
+          <a:schemeClr val="phClr"/>
+        </a:solidFill>
+        <a:solidFill>
+          <a:schemeClr val="phClr">
+            <a:tint val="95000"/>
+            <a:satMod val="170000"/>
+          </a:schemeClr>
+        </a:solidFill>
+        <a:gradFill rotWithShape="1">
+          <a:gsLst>
+            <a:gs pos="0">
+              <a:schemeClr val="phClr">
+                <a:tint val="93000"/>
+                <a:satMod val="150000"/>
+                <a:shade val="98000"/>
+                <a:lumMod val="102000"/>
+              </a:schemeClr>
+            </a:gs>
+            <a:gs pos="50000">
+              <a:schemeClr val="phClr">
+                <a:tint val="98000"/>
+                <a:satMod val="130000"/>
+                <a:shade val="90000"/>
+                <a:lumMod val="103000"/>
+              </a:schemeClr>
+            </a:gs>
+            <a:gs pos="100000">
+              <a:schemeClr val="phClr">
+                <a:shade val="63000"/>
+                <a:satMod val="120000"/>
+              </a:schemeClr>
+            </a:gs>
+          </a:gsLst>
+          <a:lin ang="5400000" scaled="0"/>
+        </a:gradFill>
+      </a:bgFillStyleLst>
+    </a:fmtScheme>
+  </a:themeElements>
+  <a:objectDefaults/>
+  <a:extraClrSchemeLst/>
+  <a:extLst>
+    <a:ext uri="{05A4C25C-085E-4340-85A3-A5531E510DB2}">
+      <thm15:themeFamily xmlns:thm15="http://schemas.microsoft.com/office/thememl/2012/main" name="Office Theme" id="{62F939B6-93AF-4DB8-9C6B-D6C7DFDC589F}" vid="{4A3C46E8-61CC-4603-A589-7422A47A8E4A}"/>
+    </a:ext>
+  </a:extLst>
+</a:theme>
 </file>
</xml_diff>

<commit_message>
add more to presentation
</commit_message>
<xml_diff>
--- a/Praesentation.pptx
+++ b/Praesentation.pptx
@@ -5,17 +5,18 @@
     <p:sldMasterId id="2147483648" r:id="rId1"/>
   </p:sldMasterIdLst>
   <p:notesMasterIdLst>
-    <p:notesMasterId r:id="rId10"/>
+    <p:notesMasterId r:id="rId11"/>
   </p:notesMasterIdLst>
   <p:sldIdLst>
     <p:sldId id="256" r:id="rId2"/>
     <p:sldId id="257" r:id="rId3"/>
-    <p:sldId id="258" r:id="rId4"/>
-    <p:sldId id="259" r:id="rId5"/>
-    <p:sldId id="260" r:id="rId6"/>
-    <p:sldId id="261" r:id="rId7"/>
-    <p:sldId id="262" r:id="rId8"/>
-    <p:sldId id="263" r:id="rId9"/>
+    <p:sldId id="264" r:id="rId4"/>
+    <p:sldId id="258" r:id="rId5"/>
+    <p:sldId id="259" r:id="rId6"/>
+    <p:sldId id="260" r:id="rId7"/>
+    <p:sldId id="261" r:id="rId8"/>
+    <p:sldId id="262" r:id="rId9"/>
+    <p:sldId id="263" r:id="rId10"/>
   </p:sldIdLst>
   <p:sldSz cx="12192000" cy="6858000"/>
   <p:notesSz cx="6858000" cy="9144000"/>
@@ -3519,7 +3520,15 @@
           <a:p>
             <a:r>
               <a:rPr lang="de-CH" dirty="0" smtClean="0"/>
-              <a:t>Erste Version 2007</a:t>
+              <a:t>Erste Version 2007, </a:t>
+            </a:r>
+            <a:r>
+              <a:rPr lang="de-CH" dirty="0"/>
+              <a:t>Version 3.0 ab Januar </a:t>
+            </a:r>
+            <a:r>
+              <a:rPr lang="de-CH" dirty="0" smtClean="0"/>
+              <a:t>2019</a:t>
             </a:r>
           </a:p>
           <a:p>
@@ -3540,9 +3549,42 @@
           <a:p>
             <a:r>
               <a:rPr lang="de-CH" dirty="0" smtClean="0"/>
-              <a:t>Version 3.0 ab Januar 2019</a:t>
-            </a:r>
-            <a:endParaRPr lang="de-CH" dirty="0"/>
+              <a:t>Webbasierte IDE</a:t>
+            </a:r>
+          </a:p>
+          <a:p>
+            <a:r>
+              <a:rPr lang="de-CH" dirty="0" smtClean="0"/>
+              <a:t>Paradigmen:</a:t>
+            </a:r>
+          </a:p>
+          <a:p>
+            <a:pPr lvl="1"/>
+            <a:r>
+              <a:rPr lang="de-CH" dirty="0" smtClean="0"/>
+              <a:t>Visuell</a:t>
+            </a:r>
+          </a:p>
+          <a:p>
+            <a:pPr lvl="1"/>
+            <a:r>
+              <a:rPr lang="de-CH" dirty="0" smtClean="0"/>
+              <a:t>Imperativ</a:t>
+            </a:r>
+          </a:p>
+          <a:p>
+            <a:pPr lvl="1"/>
+            <a:r>
+              <a:rPr lang="de-CH" dirty="0" smtClean="0"/>
+              <a:t>Objektorientiert</a:t>
+            </a:r>
+          </a:p>
+          <a:p>
+            <a:pPr lvl="1"/>
+            <a:r>
+              <a:rPr lang="de-CH" dirty="0" smtClean="0"/>
+              <a:t>Ereignisorientiert</a:t>
+            </a:r>
           </a:p>
         </p:txBody>
       </p:sp>
@@ -3646,6 +3688,132 @@
       </p:grpSpPr>
       <p:sp>
         <p:nvSpPr>
+          <p:cNvPr id="2" name="Titel 1"/>
+          <p:cNvSpPr>
+            <a:spLocks noGrp="1"/>
+          </p:cNvSpPr>
+          <p:nvPr>
+            <p:ph type="title"/>
+          </p:nvPr>
+        </p:nvSpPr>
+        <p:spPr/>
+        <p:txBody>
+          <a:bodyPr/>
+          <a:lstStyle/>
+          <a:p>
+            <a:r>
+              <a:rPr lang="de-CH" dirty="0" smtClean="0"/>
+              <a:t>Allgemeines</a:t>
+            </a:r>
+            <a:endParaRPr lang="de-CH" dirty="0"/>
+          </a:p>
+        </p:txBody>
+      </p:sp>
+      <p:sp>
+        <p:nvSpPr>
+          <p:cNvPr id="3" name="Inhaltsplatzhalter 2"/>
+          <p:cNvSpPr>
+            <a:spLocks noGrp="1"/>
+          </p:cNvSpPr>
+          <p:nvPr>
+            <p:ph idx="1"/>
+          </p:nvPr>
+        </p:nvSpPr>
+        <p:spPr/>
+        <p:txBody>
+          <a:bodyPr/>
+          <a:lstStyle/>
+          <a:p>
+            <a:r>
+              <a:rPr lang="de-CH" dirty="0" smtClean="0"/>
+              <a:t>„Figuren“ agieren auf einer „Bühne“</a:t>
+            </a:r>
+          </a:p>
+          <a:p>
+            <a:r>
+              <a:rPr lang="de-CH" dirty="0" smtClean="0"/>
+              <a:t>Sie können verschiedene „Kostüme“ (Grafiken) haben</a:t>
+            </a:r>
+          </a:p>
+          <a:p>
+            <a:r>
+              <a:rPr lang="de-CH" dirty="0" smtClean="0"/>
+              <a:t>Haben Skripte</a:t>
+            </a:r>
+          </a:p>
+          <a:p>
+            <a:pPr lvl="1"/>
+            <a:r>
+              <a:rPr lang="de-CH" dirty="0" smtClean="0"/>
+              <a:t>Beliebig viele</a:t>
+            </a:r>
+          </a:p>
+          <a:p>
+            <a:pPr lvl="1"/>
+            <a:r>
+              <a:rPr lang="de-CH" dirty="0" smtClean="0"/>
+              <a:t>Bestehen aus Blöcken</a:t>
+            </a:r>
+            <a:endParaRPr lang="de-CH" dirty="0"/>
+          </a:p>
+        </p:txBody>
+      </p:sp>
+      <p:pic>
+        <p:nvPicPr>
+          <p:cNvPr id="5" name="Bild 4"/>
+          <p:cNvPicPr>
+            <a:picLocks noChangeAspect="1"/>
+          </p:cNvPicPr>
+          <p:nvPr/>
+        </p:nvPicPr>
+        <p:blipFill>
+          <a:blip r:embed="rId2"/>
+          <a:stretch>
+            <a:fillRect/>
+          </a:stretch>
+        </p:blipFill>
+        <p:spPr>
+          <a:xfrm>
+            <a:off x="7097838" y="3346029"/>
+            <a:ext cx="4255962" cy="3189383"/>
+          </a:xfrm>
+          <a:prstGeom prst="rect">
+            <a:avLst/>
+          </a:prstGeom>
+        </p:spPr>
+      </p:pic>
+    </p:spTree>
+    <p:extLst>
+      <p:ext uri="{BB962C8B-B14F-4D97-AF65-F5344CB8AC3E}">
+        <p14:creationId xmlns:p14="http://schemas.microsoft.com/office/powerpoint/2010/main" val="326152049"/>
+      </p:ext>
+    </p:extLst>
+  </p:cSld>
+  <p:clrMapOvr>
+    <a:masterClrMapping/>
+  </p:clrMapOvr>
+</p:sld>
+</file>
+
+<file path=ppt/slides/slide4.xml><?xml version="1.0" encoding="utf-8"?>
+<p:sld xmlns:a="http://schemas.openxmlformats.org/drawingml/2006/main" xmlns:r="http://schemas.openxmlformats.org/officeDocument/2006/relationships" xmlns:p="http://schemas.openxmlformats.org/presentationml/2006/main">
+  <p:cSld>
+    <p:spTree>
+      <p:nvGrpSpPr>
+        <p:cNvPr id="1" name=""/>
+        <p:cNvGrpSpPr/>
+        <p:nvPr/>
+      </p:nvGrpSpPr>
+      <p:grpSpPr>
+        <a:xfrm>
+          <a:off x="0" y="0"/>
+          <a:ext cx="0" cy="0"/>
+          <a:chOff x="0" y="0"/>
+          <a:chExt cx="0" cy="0"/>
+        </a:xfrm>
+      </p:grpSpPr>
+      <p:sp>
+        <p:nvSpPr>
           <p:cNvPr id="2" name="Title 1"/>
           <p:cNvSpPr>
             <a:spLocks noGrp="1"/>
@@ -3683,22 +3851,18 @@
           <a:lstStyle/>
           <a:p>
             <a:r>
+              <a:rPr lang="de-CH" dirty="0" smtClean="0"/>
+              <a:t>Form = Syntax / Typ</a:t>
+            </a:r>
+          </a:p>
+          <a:p>
+            <a:r>
               <a:rPr lang="de-CH" dirty="0"/>
-              <a:t>v</a:t>
+              <a:t>Farbe = </a:t>
             </a:r>
             <a:r>
               <a:rPr lang="de-CH" dirty="0" smtClean="0"/>
-              <a:t>erschiedene Farben = Kategorien</a:t>
-            </a:r>
-          </a:p>
-          <a:p>
-            <a:r>
-              <a:rPr lang="de-CH" dirty="0"/>
-              <a:t>v</a:t>
-            </a:r>
-            <a:r>
-              <a:rPr lang="de-CH" dirty="0" smtClean="0"/>
-              <a:t>erschiedene Formen = Syntax</a:t>
+              <a:t>Kategorie</a:t>
             </a:r>
             <a:endParaRPr lang="de-CH" dirty="0"/>
           </a:p>
@@ -3807,7 +3971,7 @@
 </p:sld>
 </file>
 
-<file path=ppt/slides/slide4.xml><?xml version="1.0" encoding="utf-8"?>
+<file path=ppt/slides/slide5.xml><?xml version="1.0" encoding="utf-8"?>
 <p:sld xmlns:a="http://schemas.openxmlformats.org/drawingml/2006/main" xmlns:r="http://schemas.openxmlformats.org/officeDocument/2006/relationships" xmlns:p="http://schemas.openxmlformats.org/presentationml/2006/main">
   <p:cSld>
     <p:spTree>
@@ -3914,8 +4078,8 @@
         </p:blipFill>
         <p:spPr>
           <a:xfrm>
-            <a:off x="3128884" y="4735082"/>
-            <a:ext cx="1006111" cy="1112704"/>
+            <a:off x="1091781" y="4506789"/>
+            <a:ext cx="1217394" cy="1346371"/>
           </a:xfrm>
           <a:prstGeom prst="rect">
             <a:avLst/>
@@ -3944,8 +4108,8 @@
         </p:blipFill>
         <p:spPr>
           <a:xfrm flipH="1">
-            <a:off x="6738286" y="4787996"/>
-            <a:ext cx="1006111" cy="1112704"/>
+            <a:off x="6965798" y="4565981"/>
+            <a:ext cx="1217394" cy="1346371"/>
           </a:xfrm>
           <a:prstGeom prst="rect">
             <a:avLst/>
@@ -3960,8 +4124,8 @@
         </p:nvSpPr>
         <p:spPr>
           <a:xfrm>
-            <a:off x="4134995" y="3956384"/>
-            <a:ext cx="947450" cy="449521"/>
+            <a:off x="2203534" y="3844924"/>
+            <a:ext cx="1924282" cy="449521"/>
           </a:xfrm>
           <a:prstGeom prst="wedgeRoundRectCallout">
             <a:avLst>
@@ -3991,13 +4155,10 @@
           <a:p>
             <a:pPr algn="ctr"/>
             <a:r>
-              <a:rPr lang="de-CH" dirty="0" err="1" smtClean="0"/>
-              <a:t>Hello</a:t>
-            </a:r>
-            <a:r>
-              <a:rPr lang="de-CH" dirty="0" smtClean="0"/>
-              <a:t>!</a:t>
-            </a:r>
+              <a:rPr lang="de-CH" smtClean="0"/>
+              <a:t>Hallo zusammen!</a:t>
+            </a:r>
+            <a:endParaRPr lang="de-CH" dirty="0" smtClean="0"/>
           </a:p>
         </p:txBody>
       </p:sp>
@@ -4009,8 +4170,8 @@
         </p:nvSpPr>
         <p:spPr>
           <a:xfrm>
-            <a:off x="5478229" y="4563235"/>
-            <a:ext cx="947450" cy="449521"/>
+            <a:off x="6246947" y="4341221"/>
+            <a:ext cx="564706" cy="449521"/>
           </a:xfrm>
           <a:prstGeom prst="wedgeRoundRectCallout">
             <a:avLst>
@@ -4040,16 +4201,159 @@
           <a:p>
             <a:pPr algn="ctr"/>
             <a:r>
-              <a:rPr lang="de-CH" dirty="0" err="1" smtClean="0"/>
-              <a:t>Hello</a:t>
-            </a:r>
-            <a:r>
               <a:rPr lang="de-CH" dirty="0" smtClean="0"/>
-              <a:t>!</a:t>
-            </a:r>
-          </a:p>
-        </p:txBody>
-      </p:sp>
+              <a:t>👍🏼</a:t>
+            </a:r>
+          </a:p>
+        </p:txBody>
+      </p:sp>
+      <p:pic>
+        <p:nvPicPr>
+          <p:cNvPr id="8" name="Bild 7"/>
+          <p:cNvPicPr>
+            <a:picLocks noChangeAspect="1"/>
+          </p:cNvPicPr>
+          <p:nvPr/>
+        </p:nvPicPr>
+        <p:blipFill>
+          <a:blip r:embed="rId3"/>
+          <a:stretch>
+            <a:fillRect/>
+          </a:stretch>
+        </p:blipFill>
+        <p:spPr>
+          <a:xfrm>
+            <a:off x="2361115" y="5239166"/>
+            <a:ext cx="1800000" cy="605172"/>
+          </a:xfrm>
+          <a:prstGeom prst="rect">
+            <a:avLst/>
+          </a:prstGeom>
+        </p:spPr>
+      </p:pic>
+      <p:pic>
+        <p:nvPicPr>
+          <p:cNvPr id="9" name="Bild 8"/>
+          <p:cNvPicPr>
+            <a:picLocks noChangeAspect="1"/>
+          </p:cNvPicPr>
+          <p:nvPr/>
+        </p:nvPicPr>
+        <p:blipFill>
+          <a:blip r:embed="rId4"/>
+          <a:stretch>
+            <a:fillRect/>
+          </a:stretch>
+        </p:blipFill>
+        <p:spPr>
+          <a:xfrm>
+            <a:off x="5184363" y="5403160"/>
+            <a:ext cx="1844365" cy="900000"/>
+          </a:xfrm>
+          <a:prstGeom prst="rect">
+            <a:avLst/>
+          </a:prstGeom>
+        </p:spPr>
+      </p:pic>
+      <p:pic>
+        <p:nvPicPr>
+          <p:cNvPr id="10" name="Bild 9"/>
+          <p:cNvPicPr>
+            <a:picLocks noChangeAspect="1"/>
+          </p:cNvPicPr>
+          <p:nvPr/>
+        </p:nvPicPr>
+        <p:blipFill>
+          <a:blip r:embed="rId2">
+            <a:extLst>
+              <a:ext uri="{28A0092B-C50C-407E-A947-70E740481C1C}">
+                <a14:useLocalDpi xmlns:a14="http://schemas.microsoft.com/office/drawing/2010/main" val="0"/>
+              </a:ext>
+            </a:extLst>
+          </a:blip>
+          <a:stretch>
+            <a:fillRect/>
+          </a:stretch>
+        </p:blipFill>
+        <p:spPr>
+          <a:xfrm flipH="1">
+            <a:off x="10154120" y="4114809"/>
+            <a:ext cx="1217394" cy="1346371"/>
+          </a:xfrm>
+          <a:prstGeom prst="rect">
+            <a:avLst/>
+          </a:prstGeom>
+        </p:spPr>
+      </p:pic>
+      <p:sp>
+        <p:nvSpPr>
+          <p:cNvPr id="11" name="Abgerundete rechteckige Legende 10"/>
+          <p:cNvSpPr/>
+          <p:nvPr/>
+        </p:nvSpPr>
+        <p:spPr>
+          <a:xfrm>
+            <a:off x="9435269" y="3890049"/>
+            <a:ext cx="564706" cy="449521"/>
+          </a:xfrm>
+          <a:prstGeom prst="wedgeRoundRectCallout">
+            <a:avLst>
+              <a:gd name="adj1" fmla="val 50323"/>
+              <a:gd name="adj2" fmla="val 84557"/>
+              <a:gd name="adj3" fmla="val 16667"/>
+            </a:avLst>
+          </a:prstGeom>
+        </p:spPr>
+        <p:style>
+          <a:lnRef idx="2">
+            <a:schemeClr val="dk1"/>
+          </a:lnRef>
+          <a:fillRef idx="1">
+            <a:schemeClr val="lt1"/>
+          </a:fillRef>
+          <a:effectRef idx="0">
+            <a:schemeClr val="dk1"/>
+          </a:effectRef>
+          <a:fontRef idx="minor">
+            <a:schemeClr val="dk1"/>
+          </a:fontRef>
+        </p:style>
+        <p:txBody>
+          <a:bodyPr rtlCol="0" anchor="ctr"/>
+          <a:lstStyle/>
+          <a:p>
+            <a:pPr algn="ctr"/>
+            <a:r>
+              <a:rPr lang="de-CH" dirty="0" smtClean="0"/>
+              <a:t>👋🏼</a:t>
+            </a:r>
+          </a:p>
+        </p:txBody>
+      </p:sp>
+      <p:pic>
+        <p:nvPicPr>
+          <p:cNvPr id="12" name="Bild 11"/>
+          <p:cNvPicPr>
+            <a:picLocks noChangeAspect="1"/>
+          </p:cNvPicPr>
+          <p:nvPr/>
+        </p:nvPicPr>
+        <p:blipFill>
+          <a:blip r:embed="rId5"/>
+          <a:stretch>
+            <a:fillRect/>
+          </a:stretch>
+        </p:blipFill>
+        <p:spPr>
+          <a:xfrm>
+            <a:off x="9358935" y="5508445"/>
+            <a:ext cx="1914179" cy="900000"/>
+          </a:xfrm>
+          <a:prstGeom prst="rect">
+            <a:avLst/>
+          </a:prstGeom>
+        </p:spPr>
+      </p:pic>
     </p:spTree>
     <p:extLst>
       <p:ext uri="{BB962C8B-B14F-4D97-AF65-F5344CB8AC3E}">
@@ -4063,7 +4367,7 @@
 </p:sld>
 </file>
 
-<file path=ppt/slides/slide5.xml><?xml version="1.0" encoding="utf-8"?>
+<file path=ppt/slides/slide6.xml><?xml version="1.0" encoding="utf-8"?>
 <p:sld xmlns:a="http://schemas.openxmlformats.org/drawingml/2006/main" xmlns:r="http://schemas.openxmlformats.org/officeDocument/2006/relationships" xmlns:p="http://schemas.openxmlformats.org/presentationml/2006/main">
   <p:cSld>
     <p:spTree>
@@ -4130,7 +4434,7 @@
           <a:p>
             <a:r>
               <a:rPr lang="de-CH" dirty="0" smtClean="0"/>
-              <a:t>Figuren sind fertige Instanzen</a:t>
+              <a:t>Figuren sind quasi fertige Instanzen</a:t>
             </a:r>
           </a:p>
           <a:p>
@@ -4397,131 +4701,34 @@
           </p:spPr>
         </p:pic>
       </p:grpSp>
+      <p:pic>
+        <p:nvPicPr>
+          <p:cNvPr id="16" name="Bild 15"/>
+          <p:cNvPicPr>
+            <a:picLocks noChangeAspect="1"/>
+          </p:cNvPicPr>
+          <p:nvPr/>
+        </p:nvPicPr>
+        <p:blipFill>
+          <a:blip r:embed="rId3"/>
+          <a:stretch>
+            <a:fillRect/>
+          </a:stretch>
+        </p:blipFill>
+        <p:spPr>
+          <a:xfrm>
+            <a:off x="7136075" y="4448682"/>
+            <a:ext cx="2541561" cy="633222"/>
+          </a:xfrm>
+          <a:prstGeom prst="rect">
+            <a:avLst/>
+          </a:prstGeom>
+        </p:spPr>
+      </p:pic>
     </p:spTree>
     <p:extLst>
       <p:ext uri="{BB962C8B-B14F-4D97-AF65-F5344CB8AC3E}">
         <p14:creationId xmlns:p14="http://schemas.microsoft.com/office/powerpoint/2010/main" val="9927454"/>
-      </p:ext>
-    </p:extLst>
-  </p:cSld>
-  <p:clrMapOvr>
-    <a:masterClrMapping/>
-  </p:clrMapOvr>
-</p:sld>
-</file>
-
-<file path=ppt/slides/slide6.xml><?xml version="1.0" encoding="utf-8"?>
-<p:sld xmlns:a="http://schemas.openxmlformats.org/drawingml/2006/main" xmlns:r="http://schemas.openxmlformats.org/officeDocument/2006/relationships" xmlns:p="http://schemas.openxmlformats.org/presentationml/2006/main">
-  <p:cSld>
-    <p:spTree>
-      <p:nvGrpSpPr>
-        <p:cNvPr id="1" name=""/>
-        <p:cNvGrpSpPr/>
-        <p:nvPr/>
-      </p:nvGrpSpPr>
-      <p:grpSpPr>
-        <a:xfrm>
-          <a:off x="0" y="0"/>
-          <a:ext cx="0" cy="0"/>
-          <a:chOff x="0" y="0"/>
-          <a:chExt cx="0" cy="0"/>
-        </a:xfrm>
-      </p:grpSpPr>
-      <p:sp>
-        <p:nvSpPr>
-          <p:cNvPr id="2" name="Title 1"/>
-          <p:cNvSpPr>
-            <a:spLocks noGrp="1"/>
-          </p:cNvSpPr>
-          <p:nvPr>
-            <p:ph type="title"/>
-          </p:nvPr>
-        </p:nvSpPr>
-        <p:spPr/>
-        <p:txBody>
-          <a:bodyPr/>
-          <a:lstStyle/>
-          <a:p>
-            <a:r>
-              <a:rPr lang="de-CH" dirty="0" smtClean="0"/>
-              <a:t>Team-Fazit</a:t>
-            </a:r>
-            <a:endParaRPr lang="de-CH" dirty="0"/>
-          </a:p>
-        </p:txBody>
-      </p:sp>
-      <p:sp>
-        <p:nvSpPr>
-          <p:cNvPr id="3" name="Content Placeholder 2"/>
-          <p:cNvSpPr>
-            <a:spLocks noGrp="1"/>
-          </p:cNvSpPr>
-          <p:nvPr>
-            <p:ph idx="1"/>
-          </p:nvPr>
-        </p:nvSpPr>
-        <p:spPr/>
-        <p:txBody>
-          <a:bodyPr/>
-          <a:lstStyle/>
-          <a:p>
-            <a:r>
-              <a:rPr lang="de-CH" dirty="0" err="1" smtClean="0"/>
-              <a:t>Scratch</a:t>
-            </a:r>
-            <a:r>
-              <a:rPr lang="de-CH" dirty="0" smtClean="0"/>
-              <a:t> schafft was es verspricht:</a:t>
-            </a:r>
-          </a:p>
-          <a:p>
-            <a:pPr lvl="1"/>
-            <a:r>
-              <a:rPr lang="de-CH" dirty="0" smtClean="0"/>
-              <a:t>Einsteigerfreundlich</a:t>
-            </a:r>
-          </a:p>
-          <a:p>
-            <a:pPr lvl="1"/>
-            <a:r>
-              <a:rPr lang="de-CH" dirty="0" smtClean="0"/>
-              <a:t>Lehr-Sprache</a:t>
-            </a:r>
-          </a:p>
-          <a:p>
-            <a:r>
-              <a:rPr lang="de-CH" dirty="0" smtClean="0"/>
-              <a:t>Keine Syntaxfehler möglich</a:t>
-            </a:r>
-          </a:p>
-          <a:p>
-            <a:r>
-              <a:rPr lang="de-CH" dirty="0" smtClean="0"/>
-              <a:t>Exzessives Drag und Drop</a:t>
-            </a:r>
-          </a:p>
-          <a:p>
-            <a:r>
-              <a:rPr lang="de-CH" dirty="0" smtClean="0"/>
-              <a:t>Zum schnellen Bau von Prototypen allenfalls nützlich</a:t>
-            </a:r>
-          </a:p>
-          <a:p>
-            <a:r>
-              <a:rPr lang="de-CH" dirty="0" smtClean="0"/>
-              <a:t>Als Lehrer: Top Werkzeug!</a:t>
-            </a:r>
-            <a:endParaRPr lang="de-CH" dirty="0" smtClean="0"/>
-          </a:p>
-          <a:p>
-            <a:endParaRPr lang="de-CH" dirty="0" smtClean="0"/>
-          </a:p>
-        </p:txBody>
-      </p:sp>
-    </p:spTree>
-    <p:extLst>
-      <p:ext uri="{BB962C8B-B14F-4D97-AF65-F5344CB8AC3E}">
-        <p14:creationId xmlns:p14="http://schemas.microsoft.com/office/powerpoint/2010/main" val="3307094876"/>
       </p:ext>
     </p:extLst>
   </p:cSld>
@@ -4565,6 +4772,127 @@
           <a:p>
             <a:r>
               <a:rPr lang="de-CH" dirty="0" smtClean="0"/>
+              <a:t>Team-Fazit</a:t>
+            </a:r>
+            <a:endParaRPr lang="de-CH" dirty="0"/>
+          </a:p>
+        </p:txBody>
+      </p:sp>
+      <p:sp>
+        <p:nvSpPr>
+          <p:cNvPr id="3" name="Content Placeholder 2"/>
+          <p:cNvSpPr>
+            <a:spLocks noGrp="1"/>
+          </p:cNvSpPr>
+          <p:nvPr>
+            <p:ph idx="1"/>
+          </p:nvPr>
+        </p:nvSpPr>
+        <p:spPr/>
+        <p:txBody>
+          <a:bodyPr/>
+          <a:lstStyle/>
+          <a:p>
+            <a:r>
+              <a:rPr lang="de-CH" dirty="0" err="1" smtClean="0"/>
+              <a:t>Scratch</a:t>
+            </a:r>
+            <a:r>
+              <a:rPr lang="de-CH" dirty="0" smtClean="0"/>
+              <a:t> schafft was es verspricht:</a:t>
+            </a:r>
+          </a:p>
+          <a:p>
+            <a:pPr lvl="1"/>
+            <a:r>
+              <a:rPr lang="de-CH" dirty="0" smtClean="0"/>
+              <a:t>Einsteigerfreundlich</a:t>
+            </a:r>
+          </a:p>
+          <a:p>
+            <a:pPr lvl="1"/>
+            <a:r>
+              <a:rPr lang="de-CH" dirty="0" smtClean="0"/>
+              <a:t>Lehr-Sprache</a:t>
+            </a:r>
+          </a:p>
+          <a:p>
+            <a:r>
+              <a:rPr lang="de-CH" dirty="0" smtClean="0"/>
+              <a:t>Keine Syntaxfehler möglich</a:t>
+            </a:r>
+          </a:p>
+          <a:p>
+            <a:r>
+              <a:rPr lang="de-CH" dirty="0" smtClean="0"/>
+              <a:t>Exzessives Drag und Drop</a:t>
+            </a:r>
+          </a:p>
+          <a:p>
+            <a:r>
+              <a:rPr lang="de-CH" dirty="0" smtClean="0"/>
+              <a:t>Zum schnellen Bau von Prototypen allenfalls nützlich</a:t>
+            </a:r>
+          </a:p>
+          <a:p>
+            <a:r>
+              <a:rPr lang="de-CH" dirty="0" smtClean="0"/>
+              <a:t>Als Lehrer: Top Werkzeug!</a:t>
+            </a:r>
+            <a:endParaRPr lang="de-CH" dirty="0" smtClean="0"/>
+          </a:p>
+          <a:p>
+            <a:endParaRPr lang="de-CH" dirty="0" smtClean="0"/>
+          </a:p>
+        </p:txBody>
+      </p:sp>
+    </p:spTree>
+    <p:extLst>
+      <p:ext uri="{BB962C8B-B14F-4D97-AF65-F5344CB8AC3E}">
+        <p14:creationId xmlns:p14="http://schemas.microsoft.com/office/powerpoint/2010/main" val="3307094876"/>
+      </p:ext>
+    </p:extLst>
+  </p:cSld>
+  <p:clrMapOvr>
+    <a:masterClrMapping/>
+  </p:clrMapOvr>
+</p:sld>
+</file>
+
+<file path=ppt/slides/slide8.xml><?xml version="1.0" encoding="utf-8"?>
+<p:sld xmlns:a="http://schemas.openxmlformats.org/drawingml/2006/main" xmlns:r="http://schemas.openxmlformats.org/officeDocument/2006/relationships" xmlns:p="http://schemas.openxmlformats.org/presentationml/2006/main">
+  <p:cSld>
+    <p:spTree>
+      <p:nvGrpSpPr>
+        <p:cNvPr id="1" name=""/>
+        <p:cNvGrpSpPr/>
+        <p:nvPr/>
+      </p:nvGrpSpPr>
+      <p:grpSpPr>
+        <a:xfrm>
+          <a:off x="0" y="0"/>
+          <a:ext cx="0" cy="0"/>
+          <a:chOff x="0" y="0"/>
+          <a:chExt cx="0" cy="0"/>
+        </a:xfrm>
+      </p:grpSpPr>
+      <p:sp>
+        <p:nvSpPr>
+          <p:cNvPr id="2" name="Title 1"/>
+          <p:cNvSpPr>
+            <a:spLocks noGrp="1"/>
+          </p:cNvSpPr>
+          <p:nvPr>
+            <p:ph type="title"/>
+          </p:nvPr>
+        </p:nvSpPr>
+        <p:spPr/>
+        <p:txBody>
+          <a:bodyPr/>
+          <a:lstStyle/>
+          <a:p>
+            <a:r>
+              <a:rPr lang="de-CH" dirty="0" smtClean="0"/>
               <a:t>Persönliches </a:t>
             </a:r>
             <a:r>
@@ -4659,7 +4987,7 @@
 </p:sld>
 </file>
 
-<file path=ppt/slides/slide8.xml><?xml version="1.0" encoding="utf-8"?>
+<file path=ppt/slides/slide9.xml><?xml version="1.0" encoding="utf-8"?>
 <p:sld xmlns:a="http://schemas.openxmlformats.org/drawingml/2006/main" xmlns:r="http://schemas.openxmlformats.org/officeDocument/2006/relationships" xmlns:p="http://schemas.openxmlformats.org/presentationml/2006/main">
   <p:cSld>
     <p:spTree>

</xml_diff>

<commit_message>
added personal conclusion to presentation
</commit_message>
<xml_diff>
--- a/Praesentation.pptx
+++ b/Praesentation.pptx
@@ -205,7 +205,7 @@
           <a:p>
             <a:fld id="{464FB7A3-D3F6-BD43-9D8D-F228226847D9}" type="datetimeFigureOut">
               <a:rPr lang="de-CH" smtClean="0"/>
-              <a:t>18.12.18</a:t>
+              <a:t>18.12.2018</a:t>
             </a:fld>
             <a:endParaRPr lang="de-CH"/>
           </a:p>
@@ -364,7 +364,7 @@
           <a:p>
             <a:fld id="{A39FD048-B5E1-D14B-995A-4EE00C5F7DBD}" type="slidenum">
               <a:rPr lang="de-CH" smtClean="0"/>
-              <a:t>‹Nr.›</a:t>
+              <a:t>‹#›</a:t>
             </a:fld>
             <a:endParaRPr lang="de-CH"/>
           </a:p>
@@ -604,7 +604,7 @@
           <a:p>
             <a:fld id="{9DB3CB91-4650-4E7E-8330-F432546D6CA1}" type="datetimeFigureOut">
               <a:rPr lang="de-CH" smtClean="0"/>
-              <a:t>18.12.18</a:t>
+              <a:t>18.12.2018</a:t>
             </a:fld>
             <a:endParaRPr lang="de-CH"/>
           </a:p>
@@ -646,7 +646,7 @@
           <a:p>
             <a:fld id="{1C34969C-F2FF-4877-8080-50A3B0756916}" type="slidenum">
               <a:rPr lang="de-CH" smtClean="0"/>
-              <a:t>‹Nr.›</a:t>
+              <a:t>‹#›</a:t>
             </a:fld>
             <a:endParaRPr lang="de-CH"/>
           </a:p>
@@ -774,7 +774,7 @@
           <a:p>
             <a:fld id="{9DB3CB91-4650-4E7E-8330-F432546D6CA1}" type="datetimeFigureOut">
               <a:rPr lang="de-CH" smtClean="0"/>
-              <a:t>18.12.18</a:t>
+              <a:t>18.12.2018</a:t>
             </a:fld>
             <a:endParaRPr lang="de-CH"/>
           </a:p>
@@ -816,7 +816,7 @@
           <a:p>
             <a:fld id="{1C34969C-F2FF-4877-8080-50A3B0756916}" type="slidenum">
               <a:rPr lang="de-CH" smtClean="0"/>
-              <a:t>‹Nr.›</a:t>
+              <a:t>‹#›</a:t>
             </a:fld>
             <a:endParaRPr lang="de-CH"/>
           </a:p>
@@ -954,7 +954,7 @@
           <a:p>
             <a:fld id="{9DB3CB91-4650-4E7E-8330-F432546D6CA1}" type="datetimeFigureOut">
               <a:rPr lang="de-CH" smtClean="0"/>
-              <a:t>18.12.18</a:t>
+              <a:t>18.12.2018</a:t>
             </a:fld>
             <a:endParaRPr lang="de-CH"/>
           </a:p>
@@ -996,7 +996,7 @@
           <a:p>
             <a:fld id="{1C34969C-F2FF-4877-8080-50A3B0756916}" type="slidenum">
               <a:rPr lang="de-CH" smtClean="0"/>
-              <a:t>‹Nr.›</a:t>
+              <a:t>‹#›</a:t>
             </a:fld>
             <a:endParaRPr lang="de-CH"/>
           </a:p>
@@ -1124,7 +1124,7 @@
           <a:p>
             <a:fld id="{9DB3CB91-4650-4E7E-8330-F432546D6CA1}" type="datetimeFigureOut">
               <a:rPr lang="de-CH" smtClean="0"/>
-              <a:t>18.12.18</a:t>
+              <a:t>18.12.2018</a:t>
             </a:fld>
             <a:endParaRPr lang="de-CH"/>
           </a:p>
@@ -1166,7 +1166,7 @@
           <a:p>
             <a:fld id="{1C34969C-F2FF-4877-8080-50A3B0756916}" type="slidenum">
               <a:rPr lang="de-CH" smtClean="0"/>
-              <a:t>‹Nr.›</a:t>
+              <a:t>‹#›</a:t>
             </a:fld>
             <a:endParaRPr lang="de-CH"/>
           </a:p>
@@ -1370,7 +1370,7 @@
           <a:p>
             <a:fld id="{9DB3CB91-4650-4E7E-8330-F432546D6CA1}" type="datetimeFigureOut">
               <a:rPr lang="de-CH" smtClean="0"/>
-              <a:t>18.12.18</a:t>
+              <a:t>18.12.2018</a:t>
             </a:fld>
             <a:endParaRPr lang="de-CH"/>
           </a:p>
@@ -1412,7 +1412,7 @@
           <a:p>
             <a:fld id="{1C34969C-F2FF-4877-8080-50A3B0756916}" type="slidenum">
               <a:rPr lang="de-CH" smtClean="0"/>
-              <a:t>‹Nr.›</a:t>
+              <a:t>‹#›</a:t>
             </a:fld>
             <a:endParaRPr lang="de-CH"/>
           </a:p>
@@ -1602,7 +1602,7 @@
           <a:p>
             <a:fld id="{9DB3CB91-4650-4E7E-8330-F432546D6CA1}" type="datetimeFigureOut">
               <a:rPr lang="de-CH" smtClean="0"/>
-              <a:t>18.12.18</a:t>
+              <a:t>18.12.2018</a:t>
             </a:fld>
             <a:endParaRPr lang="de-CH"/>
           </a:p>
@@ -1644,7 +1644,7 @@
           <a:p>
             <a:fld id="{1C34969C-F2FF-4877-8080-50A3B0756916}" type="slidenum">
               <a:rPr lang="de-CH" smtClean="0"/>
-              <a:t>‹Nr.›</a:t>
+              <a:t>‹#›</a:t>
             </a:fld>
             <a:endParaRPr lang="de-CH"/>
           </a:p>
@@ -1969,7 +1969,7 @@
           <a:p>
             <a:fld id="{9DB3CB91-4650-4E7E-8330-F432546D6CA1}" type="datetimeFigureOut">
               <a:rPr lang="de-CH" smtClean="0"/>
-              <a:t>18.12.18</a:t>
+              <a:t>18.12.2018</a:t>
             </a:fld>
             <a:endParaRPr lang="de-CH"/>
           </a:p>
@@ -2011,7 +2011,7 @@
           <a:p>
             <a:fld id="{1C34969C-F2FF-4877-8080-50A3B0756916}" type="slidenum">
               <a:rPr lang="de-CH" smtClean="0"/>
-              <a:t>‹Nr.›</a:t>
+              <a:t>‹#›</a:t>
             </a:fld>
             <a:endParaRPr lang="de-CH"/>
           </a:p>
@@ -2087,7 +2087,7 @@
           <a:p>
             <a:fld id="{9DB3CB91-4650-4E7E-8330-F432546D6CA1}" type="datetimeFigureOut">
               <a:rPr lang="de-CH" smtClean="0"/>
-              <a:t>18.12.18</a:t>
+              <a:t>18.12.2018</a:t>
             </a:fld>
             <a:endParaRPr lang="de-CH"/>
           </a:p>
@@ -2129,7 +2129,7 @@
           <a:p>
             <a:fld id="{1C34969C-F2FF-4877-8080-50A3B0756916}" type="slidenum">
               <a:rPr lang="de-CH" smtClean="0"/>
-              <a:t>‹Nr.›</a:t>
+              <a:t>‹#›</a:t>
             </a:fld>
             <a:endParaRPr lang="de-CH"/>
           </a:p>
@@ -2182,7 +2182,7 @@
           <a:p>
             <a:fld id="{9DB3CB91-4650-4E7E-8330-F432546D6CA1}" type="datetimeFigureOut">
               <a:rPr lang="de-CH" smtClean="0"/>
-              <a:t>18.12.18</a:t>
+              <a:t>18.12.2018</a:t>
             </a:fld>
             <a:endParaRPr lang="de-CH"/>
           </a:p>
@@ -2224,7 +2224,7 @@
           <a:p>
             <a:fld id="{1C34969C-F2FF-4877-8080-50A3B0756916}" type="slidenum">
               <a:rPr lang="de-CH" smtClean="0"/>
-              <a:t>‹Nr.›</a:t>
+              <a:t>‹#›</a:t>
             </a:fld>
             <a:endParaRPr lang="de-CH"/>
           </a:p>
@@ -2459,7 +2459,7 @@
           <a:p>
             <a:fld id="{9DB3CB91-4650-4E7E-8330-F432546D6CA1}" type="datetimeFigureOut">
               <a:rPr lang="de-CH" smtClean="0"/>
-              <a:t>18.12.18</a:t>
+              <a:t>18.12.2018</a:t>
             </a:fld>
             <a:endParaRPr lang="de-CH"/>
           </a:p>
@@ -2501,7 +2501,7 @@
           <a:p>
             <a:fld id="{1C34969C-F2FF-4877-8080-50A3B0756916}" type="slidenum">
               <a:rPr lang="de-CH" smtClean="0"/>
-              <a:t>‹Nr.›</a:t>
+              <a:t>‹#›</a:t>
             </a:fld>
             <a:endParaRPr lang="de-CH"/>
           </a:p>
@@ -2712,7 +2712,7 @@
           <a:p>
             <a:fld id="{9DB3CB91-4650-4E7E-8330-F432546D6CA1}" type="datetimeFigureOut">
               <a:rPr lang="de-CH" smtClean="0"/>
-              <a:t>18.12.18</a:t>
+              <a:t>18.12.2018</a:t>
             </a:fld>
             <a:endParaRPr lang="de-CH"/>
           </a:p>
@@ -2754,7 +2754,7 @@
           <a:p>
             <a:fld id="{1C34969C-F2FF-4877-8080-50A3B0756916}" type="slidenum">
               <a:rPr lang="de-CH" smtClean="0"/>
-              <a:t>‹Nr.›</a:t>
+              <a:t>‹#›</a:t>
             </a:fld>
             <a:endParaRPr lang="de-CH"/>
           </a:p>
@@ -2932,7 +2932,7 @@
             <a:fld id="{9DB3CB91-4650-4E7E-8330-F432546D6CA1}" type="datetimeFigureOut">
               <a:rPr lang="de-CH" smtClean="0"/>
               <a:pPr/>
-              <a:t>18.12.18</a:t>
+              <a:t>18.12.2018</a:t>
             </a:fld>
             <a:endParaRPr lang="de-CH"/>
           </a:p>
@@ -3017,7 +3017,7 @@
             <a:fld id="{1C34969C-F2FF-4877-8080-50A3B0756916}" type="slidenum">
               <a:rPr lang="de-CH" smtClean="0"/>
               <a:pPr/>
-              <a:t>‹Nr.›</a:t>
+              <a:t>‹#›</a:t>
             </a:fld>
             <a:endParaRPr lang="de-CH"/>
           </a:p>
@@ -3429,7 +3429,7 @@
           <p:nvPr/>
         </p:nvPicPr>
         <p:blipFill>
-          <a:blip r:embed="rId3">
+          <a:blip r:embed="rId3" cstate="print">
             <a:extLst>
               <a:ext uri="{28A0092B-C50C-407E-A947-70E740481C1C}">
                 <a14:useLocalDpi xmlns:a14="http://schemas.microsoft.com/office/drawing/2010/main" val="0"/>
@@ -3635,7 +3635,7 @@
           <p:nvPr/>
         </p:nvPicPr>
         <p:blipFill>
-          <a:blip r:embed="rId3">
+          <a:blip r:embed="rId3" cstate="print">
             <a:extLst>
               <a:ext uri="{28A0092B-C50C-407E-A947-70E740481C1C}">
                 <a14:useLocalDpi xmlns:a14="http://schemas.microsoft.com/office/drawing/2010/main" val="0"/>
@@ -3907,7 +3907,7 @@
           <p:nvPr/>
         </p:nvPicPr>
         <p:blipFill>
-          <a:blip r:embed="rId3">
+          <a:blip r:embed="rId3" cstate="print">
             <a:extLst>
               <a:ext uri="{28A0092B-C50C-407E-A947-70E740481C1C}">
                 <a14:useLocalDpi xmlns:a14="http://schemas.microsoft.com/office/drawing/2010/main" val="0"/>
@@ -3937,7 +3937,7 @@
           <p:nvPr/>
         </p:nvPicPr>
         <p:blipFill>
-          <a:blip r:embed="rId4">
+          <a:blip r:embed="rId4" cstate="print">
             <a:extLst>
               <a:ext uri="{28A0092B-C50C-407E-A947-70E740481C1C}">
                 <a14:useLocalDpi xmlns:a14="http://schemas.microsoft.com/office/drawing/2010/main" val="0"/>
@@ -4065,7 +4065,7 @@
           <p:nvPr/>
         </p:nvPicPr>
         <p:blipFill>
-          <a:blip r:embed="rId2">
+          <a:blip r:embed="rId2" cstate="print">
             <a:extLst>
               <a:ext uri="{28A0092B-C50C-407E-A947-70E740481C1C}">
                 <a14:useLocalDpi xmlns:a14="http://schemas.microsoft.com/office/drawing/2010/main" val="0"/>
@@ -4095,7 +4095,7 @@
           <p:nvPr/>
         </p:nvPicPr>
         <p:blipFill>
-          <a:blip r:embed="rId2">
+          <a:blip r:embed="rId2" cstate="print">
             <a:extLst>
               <a:ext uri="{28A0092B-C50C-407E-A947-70E740481C1C}">
                 <a14:useLocalDpi xmlns:a14="http://schemas.microsoft.com/office/drawing/2010/main" val="0"/>
@@ -4264,7 +4264,7 @@
           <p:nvPr/>
         </p:nvPicPr>
         <p:blipFill>
-          <a:blip r:embed="rId2">
+          <a:blip r:embed="rId2" cstate="print">
             <a:extLst>
               <a:ext uri="{28A0092B-C50C-407E-A947-70E740481C1C}">
                 <a14:useLocalDpi xmlns:a14="http://schemas.microsoft.com/office/drawing/2010/main" val="0"/>
@@ -4469,7 +4469,7 @@
             <p:nvPr/>
           </p:nvPicPr>
           <p:blipFill>
-            <a:blip r:embed="rId2">
+            <a:blip r:embed="rId2" cstate="print">
               <a:extLst>
                 <a:ext uri="{28A0092B-C50C-407E-A947-70E740481C1C}">
                   <a14:useLocalDpi xmlns:a14="http://schemas.microsoft.com/office/drawing/2010/main" val="0"/>
@@ -4499,7 +4499,7 @@
             <p:nvPr/>
           </p:nvPicPr>
           <p:blipFill>
-            <a:blip r:embed="rId2">
+            <a:blip r:embed="rId2" cstate="print">
               <a:extLst>
                 <a:ext uri="{28A0092B-C50C-407E-A947-70E740481C1C}">
                   <a14:useLocalDpi xmlns:a14="http://schemas.microsoft.com/office/drawing/2010/main" val="0"/>
@@ -4529,7 +4529,7 @@
             <p:nvPr/>
           </p:nvPicPr>
           <p:blipFill>
-            <a:blip r:embed="rId2">
+            <a:blip r:embed="rId2" cstate="print">
               <a:extLst>
                 <a:ext uri="{28A0092B-C50C-407E-A947-70E740481C1C}">
                   <a14:useLocalDpi xmlns:a14="http://schemas.microsoft.com/office/drawing/2010/main" val="0"/>
@@ -4559,7 +4559,7 @@
             <p:nvPr/>
           </p:nvPicPr>
           <p:blipFill>
-            <a:blip r:embed="rId2">
+            <a:blip r:embed="rId2" cstate="print">
               <a:extLst>
                 <a:ext uri="{28A0092B-C50C-407E-A947-70E740481C1C}">
                   <a14:useLocalDpi xmlns:a14="http://schemas.microsoft.com/office/drawing/2010/main" val="0"/>
@@ -4589,7 +4589,7 @@
             <p:nvPr/>
           </p:nvPicPr>
           <p:blipFill>
-            <a:blip r:embed="rId2">
+            <a:blip r:embed="rId2" cstate="print">
               <a:extLst>
                 <a:ext uri="{28A0092B-C50C-407E-A947-70E740481C1C}">
                   <a14:useLocalDpi xmlns:a14="http://schemas.microsoft.com/office/drawing/2010/main" val="0"/>
@@ -4619,7 +4619,7 @@
             <p:nvPr/>
           </p:nvPicPr>
           <p:blipFill>
-            <a:blip r:embed="rId2">
+            <a:blip r:embed="rId2" cstate="print">
               <a:extLst>
                 <a:ext uri="{28A0092B-C50C-407E-A947-70E740481C1C}">
                   <a14:useLocalDpi xmlns:a14="http://schemas.microsoft.com/office/drawing/2010/main" val="0"/>
@@ -4649,7 +4649,7 @@
             <p:nvPr/>
           </p:nvPicPr>
           <p:blipFill>
-            <a:blip r:embed="rId2">
+            <a:blip r:embed="rId2" cstate="print">
               <a:extLst>
                 <a:ext uri="{28A0092B-C50C-407E-A947-70E740481C1C}">
                   <a14:useLocalDpi xmlns:a14="http://schemas.microsoft.com/office/drawing/2010/main" val="0"/>
@@ -4679,7 +4679,7 @@
             <p:nvPr/>
           </p:nvPicPr>
           <p:blipFill>
-            <a:blip r:embed="rId2">
+            <a:blip r:embed="rId2" cstate="print">
               <a:extLst>
                 <a:ext uri="{28A0092B-C50C-407E-A947-70E740481C1C}">
                   <a14:useLocalDpi xmlns:a14="http://schemas.microsoft.com/office/drawing/2010/main" val="0"/>
@@ -4839,7 +4839,6 @@
               <a:rPr lang="de-CH" dirty="0" smtClean="0"/>
               <a:t>Als Lehrer: Top Werkzeug!</a:t>
             </a:r>
-            <a:endParaRPr lang="de-CH" dirty="0" smtClean="0"/>
           </a:p>
           <a:p>
             <a:endParaRPr lang="de-CH" dirty="0" smtClean="0"/>
@@ -5042,7 +5041,50 @@
           <a:bodyPr/>
           <a:lstStyle/>
           <a:p>
-            <a:endParaRPr lang="de-CH"/>
+            <a:r>
+              <a:rPr lang="de-CH" dirty="0"/>
+              <a:t>Möglichkeiten, die man nicht </a:t>
+            </a:r>
+            <a:r>
+              <a:rPr lang="de-CH" dirty="0" smtClean="0"/>
+              <a:t>hat schränken ein</a:t>
+            </a:r>
+            <a:endParaRPr lang="de-CH" dirty="0" smtClean="0"/>
+          </a:p>
+          <a:p>
+            <a:r>
+              <a:rPr lang="de-CH" dirty="0" smtClean="0"/>
+              <a:t>Grosse und </a:t>
+            </a:r>
+            <a:r>
+              <a:rPr lang="de-CH" dirty="0" smtClean="0"/>
+              <a:t>engagierte </a:t>
+            </a:r>
+            <a:r>
+              <a:rPr lang="de-CH" dirty="0" smtClean="0"/>
+              <a:t>Community</a:t>
+            </a:r>
+          </a:p>
+          <a:p>
+            <a:pPr lvl="1"/>
+            <a:r>
+              <a:rPr lang="de-CH" dirty="0" smtClean="0"/>
+              <a:t>Viele Projekte</a:t>
+            </a:r>
+          </a:p>
+          <a:p>
+            <a:pPr lvl="1"/>
+            <a:r>
+              <a:rPr lang="de-CH" dirty="0" err="1" smtClean="0"/>
+              <a:t>Remixes</a:t>
+            </a:r>
+            <a:endParaRPr lang="de-CH" dirty="0" smtClean="0"/>
+          </a:p>
+          <a:p>
+            <a:r>
+              <a:rPr lang="de-CH" dirty="0" smtClean="0"/>
+              <a:t>Intuitiv durch und durch</a:t>
+            </a:r>
           </a:p>
         </p:txBody>
       </p:sp>

</xml_diff>

<commit_message>
Folien "Klone", "Nachrichten & Nebenläufigkei" und "Team-Fazit" erweitert
</commit_message>
<xml_diff>
--- a/Praesentation.pptx
+++ b/Praesentation.pptx
@@ -471,6 +471,174 @@
     </a:lvl9pPr>
   </p:notesStyle>
 </p:notesMaster>
+</file>
+
+<file path=ppt/notesSlides/notesSlide1.xml><?xml version="1.0" encoding="utf-8"?>
+<p:notes xmlns:a="http://schemas.openxmlformats.org/drawingml/2006/main" xmlns:r="http://schemas.openxmlformats.org/officeDocument/2006/relationships" xmlns:p="http://schemas.openxmlformats.org/presentationml/2006/main">
+  <p:cSld>
+    <p:spTree>
+      <p:nvGrpSpPr>
+        <p:cNvPr id="1" name=""/>
+        <p:cNvGrpSpPr/>
+        <p:nvPr/>
+      </p:nvGrpSpPr>
+      <p:grpSpPr>
+        <a:xfrm>
+          <a:off x="0" y="0"/>
+          <a:ext cx="0" cy="0"/>
+          <a:chOff x="0" y="0"/>
+          <a:chExt cx="0" cy="0"/>
+        </a:xfrm>
+      </p:grpSpPr>
+      <p:sp>
+        <p:nvSpPr>
+          <p:cNvPr id="2" name="Slide Image Placeholder 1"/>
+          <p:cNvSpPr>
+            <a:spLocks noGrp="1" noRot="1" noChangeAspect="1"/>
+          </p:cNvSpPr>
+          <p:nvPr>
+            <p:ph type="sldImg"/>
+          </p:nvPr>
+        </p:nvSpPr>
+        <p:spPr/>
+      </p:sp>
+      <p:sp>
+        <p:nvSpPr>
+          <p:cNvPr id="3" name="Notes Placeholder 2"/>
+          <p:cNvSpPr>
+            <a:spLocks noGrp="1"/>
+          </p:cNvSpPr>
+          <p:nvPr>
+            <p:ph type="body" idx="1"/>
+          </p:nvPr>
+        </p:nvSpPr>
+        <p:spPr/>
+        <p:txBody>
+          <a:bodyPr/>
+          <a:lstStyle/>
+          <a:p>
+            <a:endParaRPr lang="de-CH" dirty="0"/>
+          </a:p>
+        </p:txBody>
+      </p:sp>
+      <p:sp>
+        <p:nvSpPr>
+          <p:cNvPr id="4" name="Slide Number Placeholder 3"/>
+          <p:cNvSpPr>
+            <a:spLocks noGrp="1"/>
+          </p:cNvSpPr>
+          <p:nvPr>
+            <p:ph type="sldNum" sz="quarter" idx="10"/>
+          </p:nvPr>
+        </p:nvSpPr>
+        <p:spPr/>
+        <p:txBody>
+          <a:bodyPr/>
+          <a:lstStyle/>
+          <a:p>
+            <a:fld id="{A39FD048-B5E1-D14B-995A-4EE00C5F7DBD}" type="slidenum">
+              <a:rPr lang="de-CH" smtClean="0"/>
+              <a:t>1</a:t>
+            </a:fld>
+            <a:endParaRPr lang="de-CH"/>
+          </a:p>
+        </p:txBody>
+      </p:sp>
+    </p:spTree>
+    <p:extLst>
+      <p:ext uri="{BB962C8B-B14F-4D97-AF65-F5344CB8AC3E}">
+        <p14:creationId xmlns:p14="http://schemas.microsoft.com/office/powerpoint/2010/main" val="2350523888"/>
+      </p:ext>
+    </p:extLst>
+  </p:cSld>
+  <p:clrMapOvr>
+    <a:masterClrMapping/>
+  </p:clrMapOvr>
+</p:notes>
+</file>
+
+<file path=ppt/notesSlides/notesSlide2.xml><?xml version="1.0" encoding="utf-8"?>
+<p:notes xmlns:a="http://schemas.openxmlformats.org/drawingml/2006/main" xmlns:r="http://schemas.openxmlformats.org/officeDocument/2006/relationships" xmlns:p="http://schemas.openxmlformats.org/presentationml/2006/main">
+  <p:cSld>
+    <p:spTree>
+      <p:nvGrpSpPr>
+        <p:cNvPr id="1" name=""/>
+        <p:cNvGrpSpPr/>
+        <p:nvPr/>
+      </p:nvGrpSpPr>
+      <p:grpSpPr>
+        <a:xfrm>
+          <a:off x="0" y="0"/>
+          <a:ext cx="0" cy="0"/>
+          <a:chOff x="0" y="0"/>
+          <a:chExt cx="0" cy="0"/>
+        </a:xfrm>
+      </p:grpSpPr>
+      <p:sp>
+        <p:nvSpPr>
+          <p:cNvPr id="2" name="Slide Image Placeholder 1"/>
+          <p:cNvSpPr>
+            <a:spLocks noGrp="1" noRot="1" noChangeAspect="1"/>
+          </p:cNvSpPr>
+          <p:nvPr>
+            <p:ph type="sldImg"/>
+          </p:nvPr>
+        </p:nvSpPr>
+        <p:spPr/>
+      </p:sp>
+      <p:sp>
+        <p:nvSpPr>
+          <p:cNvPr id="3" name="Notes Placeholder 2"/>
+          <p:cNvSpPr>
+            <a:spLocks noGrp="1"/>
+          </p:cNvSpPr>
+          <p:nvPr>
+            <p:ph type="body" idx="1"/>
+          </p:nvPr>
+        </p:nvSpPr>
+        <p:spPr/>
+        <p:txBody>
+          <a:bodyPr/>
+          <a:lstStyle/>
+          <a:p>
+            <a:endParaRPr lang="de-CH" dirty="0"/>
+          </a:p>
+        </p:txBody>
+      </p:sp>
+      <p:sp>
+        <p:nvSpPr>
+          <p:cNvPr id="4" name="Slide Number Placeholder 3"/>
+          <p:cNvSpPr>
+            <a:spLocks noGrp="1"/>
+          </p:cNvSpPr>
+          <p:nvPr>
+            <p:ph type="sldNum" sz="quarter" idx="10"/>
+          </p:nvPr>
+        </p:nvSpPr>
+        <p:spPr/>
+        <p:txBody>
+          <a:bodyPr/>
+          <a:lstStyle/>
+          <a:p>
+            <a:fld id="{A39FD048-B5E1-D14B-995A-4EE00C5F7DBD}" type="slidenum">
+              <a:rPr lang="de-CH" smtClean="0"/>
+              <a:t>2</a:t>
+            </a:fld>
+            <a:endParaRPr lang="de-CH"/>
+          </a:p>
+        </p:txBody>
+      </p:sp>
+    </p:spTree>
+    <p:extLst>
+      <p:ext uri="{BB962C8B-B14F-4D97-AF65-F5344CB8AC3E}">
+        <p14:creationId xmlns:p14="http://schemas.microsoft.com/office/powerpoint/2010/main" val="1431224253"/>
+      </p:ext>
+    </p:extLst>
+  </p:cSld>
+  <p:clrMapOvr>
+    <a:masterClrMapping/>
+  </p:clrMapOvr>
+</p:notes>
 </file>
 
 <file path=ppt/slideLayouts/slideLayout1.xml><?xml version="1.0" encoding="utf-8"?>
@@ -3405,7 +3573,7 @@
           <p:nvPr/>
         </p:nvPicPr>
         <p:blipFill>
-          <a:blip r:embed="rId2"/>
+          <a:blip r:embed="rId3"/>
           <a:stretch>
             <a:fillRect/>
           </a:stretch>
@@ -3429,7 +3597,7 @@
           <p:nvPr/>
         </p:nvPicPr>
         <p:blipFill>
-          <a:blip r:embed="rId3" cstate="print">
+          <a:blip r:embed="rId4" cstate="print">
             <a:extLst>
               <a:ext uri="{28A0092B-C50C-407E-A947-70E740481C1C}">
                 <a14:useLocalDpi xmlns:a14="http://schemas.microsoft.com/office/drawing/2010/main" val="0"/>
@@ -3460,6 +3628,13 @@
   <p:clrMapOvr>
     <a:masterClrMapping/>
   </p:clrMapOvr>
+  <p:timing>
+    <p:tnLst>
+      <p:par>
+        <p:cTn id="1" dur="indefinite" restart="never" nodeType="tmRoot"/>
+      </p:par>
+    </p:tnLst>
+  </p:timing>
 </p:sld>
 </file>
 
@@ -3614,7 +3789,7 @@
                 <a:latin typeface="Marker Felt Thin" charset="0"/>
                 <a:ea typeface="Marker Felt Thin" charset="0"/>
                 <a:cs typeface="Marker Felt Thin" charset="0"/>
-                <a:hlinkClick r:id="rId2"/>
+                <a:hlinkClick r:id="rId3"/>
               </a:rPr>
               <a:t>https://scratch.mit.edu</a:t>
             </a:r>
@@ -3635,7 +3810,7 @@
           <p:nvPr/>
         </p:nvPicPr>
         <p:blipFill>
-          <a:blip r:embed="rId3" cstate="print">
+          <a:blip r:embed="rId4" cstate="print">
             <a:extLst>
               <a:ext uri="{28A0092B-C50C-407E-A947-70E740481C1C}">
                 <a14:useLocalDpi xmlns:a14="http://schemas.microsoft.com/office/drawing/2010/main" val="0"/>
@@ -3666,6 +3841,13 @@
   <p:clrMapOvr>
     <a:masterClrMapping/>
   </p:clrMapOvr>
+  <p:timing>
+    <p:tnLst>
+      <p:par>
+        <p:cTn id="1" dur="indefinite" restart="never" nodeType="tmRoot"/>
+      </p:par>
+    </p:tnLst>
+  </p:timing>
 </p:sld>
 </file>
 
@@ -4034,17 +4216,31 @@
               <a:rPr lang="de-CH" dirty="0" smtClean="0"/>
               <a:t>Broadcast einer Nachricht</a:t>
             </a:r>
-          </a:p>
-          <a:p>
-            <a:r>
-              <a:rPr lang="de-CH" dirty="0" smtClean="0"/>
-              <a:t>Nachrichten empfangen und darauf reagieren</a:t>
-            </a:r>
-          </a:p>
-          <a:p>
-            <a:r>
-              <a:rPr lang="de-CH" dirty="0" smtClean="0"/>
-              <a:t>Mehrere Figuren können Nachrichten empfangen </a:t>
+            <a:endParaRPr lang="de-CH" dirty="0" smtClean="0"/>
+          </a:p>
+          <a:p>
+            <a:r>
+              <a:rPr lang="de-CH" dirty="0" smtClean="0"/>
+              <a:t>Auf Empfang von Nachrichten warten &amp; reagieren</a:t>
+            </a:r>
+            <a:endParaRPr lang="de-CH" dirty="0" smtClean="0"/>
+          </a:p>
+          <a:p>
+            <a:r>
+              <a:rPr lang="de-CH" dirty="0" smtClean="0"/>
+              <a:t>Alle </a:t>
+            </a:r>
+            <a:r>
+              <a:rPr lang="de-CH" dirty="0" smtClean="0"/>
+              <a:t>Figuren können </a:t>
+            </a:r>
+            <a:r>
+              <a:rPr lang="de-CH" dirty="0" smtClean="0"/>
+              <a:t>jederzeit Nachricht </a:t>
+            </a:r>
+            <a:r>
+              <a:rPr lang="de-CH" dirty="0" smtClean="0"/>
+              <a:t>empfangen </a:t>
             </a:r>
             <a:r>
               <a:rPr lang="de-CH" dirty="0" smtClean="0">
@@ -4124,7 +4320,7 @@
         </p:nvSpPr>
         <p:spPr>
           <a:xfrm>
-            <a:off x="2203534" y="3844924"/>
+            <a:off x="2562756" y="4113050"/>
             <a:ext cx="1924282" cy="449521"/>
           </a:xfrm>
           <a:prstGeom prst="wedgeRoundRectCallout">
@@ -4440,9 +4636,34 @@
           <a:p>
             <a:r>
               <a:rPr lang="de-CH" dirty="0" smtClean="0"/>
-              <a:t>Zur Laufzeit kann Figur geklont werden</a:t>
-            </a:r>
-            <a:endParaRPr lang="de-CH" dirty="0"/>
+              <a:t>Zur </a:t>
+            </a:r>
+            <a:r>
+              <a:rPr lang="de-CH" dirty="0" smtClean="0"/>
+              <a:t>Laufzeit können Klone</a:t>
+            </a:r>
+          </a:p>
+          <a:p>
+            <a:pPr lvl="1"/>
+            <a:r>
+              <a:rPr lang="de-CH" dirty="0" smtClean="0"/>
+              <a:t>von Figuren gemacht werden (auch von anderen)</a:t>
+            </a:r>
+          </a:p>
+          <a:p>
+            <a:pPr lvl="1"/>
+            <a:r>
+              <a:rPr lang="de-CH" dirty="0" smtClean="0"/>
+              <a:t>gelöscht werden</a:t>
+            </a:r>
+            <a:endParaRPr lang="de-CH" dirty="0" smtClean="0"/>
+          </a:p>
+          <a:p>
+            <a:pPr lvl="1"/>
+            <a:r>
+              <a:rPr lang="de-CH" dirty="0" smtClean="0"/>
+              <a:t>auf ihre eigene Entstehung reagieren</a:t>
+            </a:r>
           </a:p>
         </p:txBody>
       </p:sp>
@@ -4799,7 +5020,15 @@
             </a:r>
             <a:r>
               <a:rPr lang="de-CH" dirty="0" smtClean="0"/>
-              <a:t> schafft was es verspricht:</a:t>
+              <a:t> </a:t>
+            </a:r>
+            <a:r>
+              <a:rPr lang="de-CH" dirty="0" smtClean="0"/>
+              <a:t>schafft zu halten, </a:t>
+            </a:r>
+            <a:r>
+              <a:rPr lang="de-CH" dirty="0" smtClean="0"/>
+              <a:t>was es verspricht:</a:t>
             </a:r>
           </a:p>
           <a:p>
@@ -4817,6 +5046,13 @@
             </a:r>
           </a:p>
           <a:p>
+            <a:pPr lvl="1"/>
+            <a:r>
+              <a:rPr lang="de-CH" dirty="0" smtClean="0"/>
+              <a:t>Anregung zu Kreativität, systematischem Denken und Kooperation</a:t>
+            </a:r>
+          </a:p>
+          <a:p>
             <a:r>
               <a:rPr lang="de-CH" dirty="0" smtClean="0"/>
               <a:t>Keine Syntaxfehler möglich</a:t>
@@ -4825,7 +5061,11 @@
           <a:p>
             <a:r>
               <a:rPr lang="de-CH" dirty="0" smtClean="0"/>
-              <a:t>Exzessives Drag und Drop</a:t>
+              <a:t>Exzessives </a:t>
+            </a:r>
+            <a:r>
+              <a:rPr lang="de-CH" dirty="0" smtClean="0"/>
+              <a:t>Drag und Drop</a:t>
             </a:r>
           </a:p>
           <a:p>
@@ -5049,20 +5289,11 @@
               <a:rPr lang="de-CH" dirty="0" smtClean="0"/>
               <a:t>hat schränken ein</a:t>
             </a:r>
-            <a:endParaRPr lang="de-CH" dirty="0" smtClean="0"/>
-          </a:p>
-          <a:p>
-            <a:r>
-              <a:rPr lang="de-CH" dirty="0" smtClean="0"/>
-              <a:t>Grosse und </a:t>
-            </a:r>
-            <a:r>
-              <a:rPr lang="de-CH" dirty="0" smtClean="0"/>
-              <a:t>engagierte </a:t>
-            </a:r>
-            <a:r>
-              <a:rPr lang="de-CH" dirty="0" smtClean="0"/>
-              <a:t>Community</a:t>
+          </a:p>
+          <a:p>
+            <a:r>
+              <a:rPr lang="de-CH" dirty="0" smtClean="0"/>
+              <a:t>Grosse und engagierte Community</a:t>
             </a:r>
           </a:p>
           <a:p>

</xml_diff>

<commit_message>
"Einleitung" erweitert, Schlussfolie eingefügt
</commit_message>
<xml_diff>
--- a/Praesentation.pptx
+++ b/Praesentation.pptx
@@ -5,7 +5,7 @@
     <p:sldMasterId id="2147483648" r:id="rId1"/>
   </p:sldMasterIdLst>
   <p:notesMasterIdLst>
-    <p:notesMasterId r:id="rId11"/>
+    <p:notesMasterId r:id="rId12"/>
   </p:notesMasterIdLst>
   <p:sldIdLst>
     <p:sldId id="256" r:id="rId2"/>
@@ -17,6 +17,7 @@
     <p:sldId id="261" r:id="rId8"/>
     <p:sldId id="262" r:id="rId9"/>
     <p:sldId id="263" r:id="rId10"/>
+    <p:sldId id="265" r:id="rId11"/>
   </p:sldIdLst>
   <p:sldSz cx="12192000" cy="6858000"/>
   <p:notesSz cx="6858000" cy="9144000"/>
@@ -632,6 +633,90 @@
     <p:extLst>
       <p:ext uri="{BB962C8B-B14F-4D97-AF65-F5344CB8AC3E}">
         <p14:creationId xmlns:p14="http://schemas.microsoft.com/office/powerpoint/2010/main" val="1431224253"/>
+      </p:ext>
+    </p:extLst>
+  </p:cSld>
+  <p:clrMapOvr>
+    <a:masterClrMapping/>
+  </p:clrMapOvr>
+</p:notes>
+</file>
+
+<file path=ppt/notesSlides/notesSlide3.xml><?xml version="1.0" encoding="utf-8"?>
+<p:notes xmlns:a="http://schemas.openxmlformats.org/drawingml/2006/main" xmlns:r="http://schemas.openxmlformats.org/officeDocument/2006/relationships" xmlns:p="http://schemas.openxmlformats.org/presentationml/2006/main">
+  <p:cSld>
+    <p:spTree>
+      <p:nvGrpSpPr>
+        <p:cNvPr id="1" name=""/>
+        <p:cNvGrpSpPr/>
+        <p:nvPr/>
+      </p:nvGrpSpPr>
+      <p:grpSpPr>
+        <a:xfrm>
+          <a:off x="0" y="0"/>
+          <a:ext cx="0" cy="0"/>
+          <a:chOff x="0" y="0"/>
+          <a:chExt cx="0" cy="0"/>
+        </a:xfrm>
+      </p:grpSpPr>
+      <p:sp>
+        <p:nvSpPr>
+          <p:cNvPr id="2" name="Slide Image Placeholder 1"/>
+          <p:cNvSpPr>
+            <a:spLocks noGrp="1" noRot="1" noChangeAspect="1"/>
+          </p:cNvSpPr>
+          <p:nvPr>
+            <p:ph type="sldImg"/>
+          </p:nvPr>
+        </p:nvSpPr>
+        <p:spPr/>
+      </p:sp>
+      <p:sp>
+        <p:nvSpPr>
+          <p:cNvPr id="3" name="Notes Placeholder 2"/>
+          <p:cNvSpPr>
+            <a:spLocks noGrp="1"/>
+          </p:cNvSpPr>
+          <p:nvPr>
+            <p:ph type="body" idx="1"/>
+          </p:nvPr>
+        </p:nvSpPr>
+        <p:spPr/>
+        <p:txBody>
+          <a:bodyPr/>
+          <a:lstStyle/>
+          <a:p>
+            <a:endParaRPr lang="de-CH" dirty="0"/>
+          </a:p>
+        </p:txBody>
+      </p:sp>
+      <p:sp>
+        <p:nvSpPr>
+          <p:cNvPr id="4" name="Slide Number Placeholder 3"/>
+          <p:cNvSpPr>
+            <a:spLocks noGrp="1"/>
+          </p:cNvSpPr>
+          <p:nvPr>
+            <p:ph type="sldNum" sz="quarter" idx="10"/>
+          </p:nvPr>
+        </p:nvSpPr>
+        <p:spPr/>
+        <p:txBody>
+          <a:bodyPr/>
+          <a:lstStyle/>
+          <a:p>
+            <a:fld id="{A39FD048-B5E1-D14B-995A-4EE00C5F7DBD}" type="slidenum">
+              <a:rPr lang="de-CH" smtClean="0"/>
+              <a:t>10</a:t>
+            </a:fld>
+            <a:endParaRPr lang="de-CH"/>
+          </a:p>
+        </p:txBody>
+      </p:sp>
+    </p:spTree>
+    <p:extLst>
+      <p:ext uri="{BB962C8B-B14F-4D97-AF65-F5344CB8AC3E}">
+        <p14:creationId xmlns:p14="http://schemas.microsoft.com/office/powerpoint/2010/main" val="3723602181"/>
       </p:ext>
     </p:extLst>
   </p:cSld>
@@ -3638,6 +3723,135 @@
 </p:sld>
 </file>
 
+<file path=ppt/slides/slide10.xml><?xml version="1.0" encoding="utf-8"?>
+<p:sld xmlns:a="http://schemas.openxmlformats.org/drawingml/2006/main" xmlns:r="http://schemas.openxmlformats.org/officeDocument/2006/relationships" xmlns:p="http://schemas.openxmlformats.org/presentationml/2006/main">
+  <p:cSld>
+    <p:spTree>
+      <p:nvGrpSpPr>
+        <p:cNvPr id="1" name=""/>
+        <p:cNvGrpSpPr/>
+        <p:nvPr/>
+      </p:nvGrpSpPr>
+      <p:grpSpPr>
+        <a:xfrm>
+          <a:off x="0" y="0"/>
+          <a:ext cx="0" cy="0"/>
+          <a:chOff x="0" y="0"/>
+          <a:chExt cx="0" cy="0"/>
+        </a:xfrm>
+      </p:grpSpPr>
+      <p:sp>
+        <p:nvSpPr>
+          <p:cNvPr id="3" name="Subtitle 2"/>
+          <p:cNvSpPr>
+            <a:spLocks noGrp="1"/>
+          </p:cNvSpPr>
+          <p:nvPr>
+            <p:ph type="subTitle" idx="1"/>
+          </p:nvPr>
+        </p:nvSpPr>
+        <p:spPr>
+          <a:xfrm>
+            <a:off x="1523999" y="4902028"/>
+            <a:ext cx="9144000" cy="1655762"/>
+          </a:xfrm>
+        </p:spPr>
+        <p:txBody>
+          <a:bodyPr>
+            <a:normAutofit/>
+          </a:bodyPr>
+          <a:lstStyle/>
+          <a:p>
+            <a:r>
+              <a:rPr lang="de-DE" sz="4800" dirty="0">
+                <a:hlinkClick r:id="rId3"/>
+              </a:rPr>
+              <a:t>https://</a:t>
+            </a:r>
+            <a:r>
+              <a:rPr lang="de-DE" sz="4800" dirty="0" smtClean="0">
+                <a:hlinkClick r:id="rId3"/>
+              </a:rPr>
+              <a:t>scratch.mit.edu</a:t>
+            </a:r>
+            <a:endParaRPr lang="de-DE" sz="4800" dirty="0"/>
+          </a:p>
+        </p:txBody>
+      </p:sp>
+      <p:pic>
+        <p:nvPicPr>
+          <p:cNvPr id="7" name="Bild 6"/>
+          <p:cNvPicPr>
+            <a:picLocks noChangeAspect="1"/>
+          </p:cNvPicPr>
+          <p:nvPr/>
+        </p:nvPicPr>
+        <p:blipFill>
+          <a:blip r:embed="rId4"/>
+          <a:stretch>
+            <a:fillRect/>
+          </a:stretch>
+        </p:blipFill>
+        <p:spPr>
+          <a:xfrm>
+            <a:off x="1576085" y="1049703"/>
+            <a:ext cx="9039828" cy="2753854"/>
+          </a:xfrm>
+          <a:prstGeom prst="rect">
+            <a:avLst/>
+          </a:prstGeom>
+        </p:spPr>
+      </p:pic>
+      <p:pic>
+        <p:nvPicPr>
+          <p:cNvPr id="9" name="Bild 8"/>
+          <p:cNvPicPr>
+            <a:picLocks noChangeAspect="1"/>
+          </p:cNvPicPr>
+          <p:nvPr/>
+        </p:nvPicPr>
+        <p:blipFill>
+          <a:blip r:embed="rId5" cstate="print">
+            <a:extLst>
+              <a:ext uri="{28A0092B-C50C-407E-A947-70E740481C1C}">
+                <a14:useLocalDpi xmlns:a14="http://schemas.microsoft.com/office/drawing/2010/main" val="0"/>
+              </a:ext>
+            </a:extLst>
+          </a:blip>
+          <a:stretch>
+            <a:fillRect/>
+          </a:stretch>
+        </p:blipFill>
+        <p:spPr>
+          <a:xfrm flipH="1">
+            <a:off x="9411883" y="4025335"/>
+            <a:ext cx="2159306" cy="2388076"/>
+          </a:xfrm>
+          <a:prstGeom prst="rect">
+            <a:avLst/>
+          </a:prstGeom>
+        </p:spPr>
+      </p:pic>
+    </p:spTree>
+    <p:extLst>
+      <p:ext uri="{BB962C8B-B14F-4D97-AF65-F5344CB8AC3E}">
+        <p14:creationId xmlns:p14="http://schemas.microsoft.com/office/powerpoint/2010/main" val="2885214209"/>
+      </p:ext>
+    </p:extLst>
+  </p:cSld>
+  <p:clrMapOvr>
+    <a:masterClrMapping/>
+  </p:clrMapOvr>
+  <p:timing>
+    <p:tnLst>
+      <p:par>
+        <p:cTn id="1" dur="indefinite" restart="never" nodeType="tmRoot"/>
+      </p:par>
+    </p:tnLst>
+  </p:timing>
+</p:sld>
+</file>
+
 <file path=ppt/slides/slide2.xml><?xml version="1.0" encoding="utf-8"?>
 <p:sld xmlns:a="http://schemas.openxmlformats.org/drawingml/2006/main" xmlns:r="http://schemas.openxmlformats.org/officeDocument/2006/relationships" xmlns:p="http://schemas.openxmlformats.org/presentationml/2006/main">
   <p:cSld>
@@ -3690,42 +3904,54 @@
         </p:nvSpPr>
         <p:spPr/>
         <p:txBody>
-          <a:bodyPr/>
+          <a:bodyPr>
+            <a:normAutofit/>
+          </a:bodyPr>
           <a:lstStyle/>
           <a:p>
             <a:r>
               <a:rPr lang="de-CH" dirty="0" smtClean="0"/>
-              <a:t>Erste Version 2007, </a:t>
-            </a:r>
-            <a:r>
-              <a:rPr lang="de-CH" dirty="0"/>
-              <a:t>Version 3.0 ab Januar </a:t>
+              <a:t>2007 von </a:t>
             </a:r>
             <a:r>
               <a:rPr lang="de-CH" dirty="0" smtClean="0"/>
-              <a:t>2019</a:t>
-            </a:r>
-          </a:p>
-          <a:p>
-            <a:r>
-              <a:rPr lang="de-CH" dirty="0"/>
-              <a:t>v</a:t>
-            </a:r>
-            <a:r>
-              <a:rPr lang="de-CH" dirty="0" smtClean="0"/>
-              <a:t>on MIT Professor Mitchel </a:t>
+              <a:t>MIT Professor Mitchel </a:t>
             </a:r>
             <a:r>
               <a:rPr lang="de-CH" dirty="0" err="1" smtClean="0"/>
               <a:t>Resnick</a:t>
             </a:r>
+            <a:r>
+              <a:rPr lang="de-CH" dirty="0" smtClean="0"/>
+              <a:t> </a:t>
+            </a:r>
+            <a:r>
+              <a:rPr lang="de-CH" dirty="0" err="1" smtClean="0"/>
+              <a:t>released</a:t>
+            </a:r>
             <a:endParaRPr lang="de-CH" dirty="0" smtClean="0"/>
           </a:p>
           <a:p>
             <a:r>
               <a:rPr lang="de-CH" dirty="0" smtClean="0"/>
-              <a:t>Webbasierte IDE</a:t>
-            </a:r>
+              <a:t>Ab 2. Januar </a:t>
+            </a:r>
+            <a:r>
+              <a:rPr lang="de-CH" dirty="0" err="1" smtClean="0"/>
+              <a:t>public</a:t>
+            </a:r>
+            <a:r>
+              <a:rPr lang="de-CH" dirty="0" smtClean="0"/>
+              <a:t> Release 3.0</a:t>
+            </a:r>
+            <a:endParaRPr lang="de-CH" dirty="0" smtClean="0"/>
+          </a:p>
+          <a:p>
+            <a:r>
+              <a:rPr lang="de-CH" dirty="0" smtClean="0"/>
+              <a:t>Webbasierte IDE (HTML5)</a:t>
+            </a:r>
+            <a:endParaRPr lang="de-CH" dirty="0" smtClean="0"/>
           </a:p>
           <a:p>
             <a:r>
@@ -3771,8 +3997,8 @@
         </p:nvSpPr>
         <p:spPr>
           <a:xfrm rot="20807413">
-            <a:off x="7912257" y="5261644"/>
-            <a:ext cx="3161122" cy="477054"/>
+            <a:off x="7830344" y="5261644"/>
+            <a:ext cx="3324949" cy="477054"/>
           </a:xfrm>
           <a:prstGeom prst="rect">
             <a:avLst/>
@@ -4216,31 +4442,17 @@
               <a:rPr lang="de-CH" dirty="0" smtClean="0"/>
               <a:t>Broadcast einer Nachricht</a:t>
             </a:r>
-            <a:endParaRPr lang="de-CH" dirty="0" smtClean="0"/>
           </a:p>
           <a:p>
             <a:r>
               <a:rPr lang="de-CH" dirty="0" smtClean="0"/>
               <a:t>Auf Empfang von Nachrichten warten &amp; reagieren</a:t>
             </a:r>
-            <a:endParaRPr lang="de-CH" dirty="0" smtClean="0"/>
           </a:p>
           <a:p>
             <a:r>
               <a:rPr lang="de-CH" dirty="0" smtClean="0"/>
-              <a:t>Alle </a:t>
-            </a:r>
-            <a:r>
-              <a:rPr lang="de-CH" dirty="0" smtClean="0"/>
-              <a:t>Figuren können </a:t>
-            </a:r>
-            <a:r>
-              <a:rPr lang="de-CH" dirty="0" smtClean="0"/>
-              <a:t>jederzeit Nachricht </a:t>
-            </a:r>
-            <a:r>
-              <a:rPr lang="de-CH" dirty="0" smtClean="0"/>
-              <a:t>empfangen </a:t>
+              <a:t>Alle Figuren können jederzeit Nachricht empfangen </a:t>
             </a:r>
             <a:r>
               <a:rPr lang="de-CH" dirty="0" smtClean="0">
@@ -4636,11 +4848,7 @@
           <a:p>
             <a:r>
               <a:rPr lang="de-CH" dirty="0" smtClean="0"/>
-              <a:t>Zur </a:t>
-            </a:r>
-            <a:r>
-              <a:rPr lang="de-CH" dirty="0" smtClean="0"/>
-              <a:t>Laufzeit können Klone</a:t>
+              <a:t>Zur Laufzeit können Klone</a:t>
             </a:r>
           </a:p>
           <a:p>
@@ -4656,7 +4864,6 @@
               <a:rPr lang="de-CH" dirty="0" smtClean="0"/>
               <a:t>gelöscht werden</a:t>
             </a:r>
-            <a:endParaRPr lang="de-CH" dirty="0" smtClean="0"/>
           </a:p>
           <a:p>
             <a:pPr lvl="1"/>
@@ -5020,15 +5227,7 @@
             </a:r>
             <a:r>
               <a:rPr lang="de-CH" dirty="0" smtClean="0"/>
-              <a:t> </a:t>
-            </a:r>
-            <a:r>
-              <a:rPr lang="de-CH" dirty="0" smtClean="0"/>
-              <a:t>schafft zu halten, </a:t>
-            </a:r>
-            <a:r>
-              <a:rPr lang="de-CH" dirty="0" smtClean="0"/>
-              <a:t>was es verspricht:</a:t>
+              <a:t> schafft zu halten, was es verspricht:</a:t>
             </a:r>
           </a:p>
           <a:p>
@@ -5061,11 +5260,7 @@
           <a:p>
             <a:r>
               <a:rPr lang="de-CH" dirty="0" smtClean="0"/>
-              <a:t>Exzessives </a:t>
-            </a:r>
-            <a:r>
-              <a:rPr lang="de-CH" dirty="0" smtClean="0"/>
-              <a:t>Drag und Drop</a:t>
+              <a:t>Exzessives Drag und Drop</a:t>
             </a:r>
           </a:p>
           <a:p>

</xml_diff>

<commit_message>
finish(?) presentation including pdf export
</commit_message>
<xml_diff>
--- a/Praesentation.pptx
+++ b/Praesentation.pptx
@@ -206,7 +206,7 @@
           <a:p>
             <a:fld id="{464FB7A3-D3F6-BD43-9D8D-F228226847D9}" type="datetimeFigureOut">
               <a:rPr lang="de-CH" smtClean="0"/>
-              <a:t>18.12.2018</a:t>
+              <a:t>18.12.18</a:t>
             </a:fld>
             <a:endParaRPr lang="de-CH"/>
           </a:p>
@@ -365,7 +365,7 @@
           <a:p>
             <a:fld id="{A39FD048-B5E1-D14B-995A-4EE00C5F7DBD}" type="slidenum">
               <a:rPr lang="de-CH" smtClean="0"/>
-              <a:t>‹#›</a:t>
+              <a:t>‹Nr.›</a:t>
             </a:fld>
             <a:endParaRPr lang="de-CH"/>
           </a:p>
@@ -857,7 +857,7 @@
           <a:p>
             <a:fld id="{9DB3CB91-4650-4E7E-8330-F432546D6CA1}" type="datetimeFigureOut">
               <a:rPr lang="de-CH" smtClean="0"/>
-              <a:t>18.12.2018</a:t>
+              <a:t>18.12.18</a:t>
             </a:fld>
             <a:endParaRPr lang="de-CH"/>
           </a:p>
@@ -899,7 +899,7 @@
           <a:p>
             <a:fld id="{1C34969C-F2FF-4877-8080-50A3B0756916}" type="slidenum">
               <a:rPr lang="de-CH" smtClean="0"/>
-              <a:t>‹#›</a:t>
+              <a:t>‹Nr.›</a:t>
             </a:fld>
             <a:endParaRPr lang="de-CH"/>
           </a:p>
@@ -1027,7 +1027,7 @@
           <a:p>
             <a:fld id="{9DB3CB91-4650-4E7E-8330-F432546D6CA1}" type="datetimeFigureOut">
               <a:rPr lang="de-CH" smtClean="0"/>
-              <a:t>18.12.2018</a:t>
+              <a:t>18.12.18</a:t>
             </a:fld>
             <a:endParaRPr lang="de-CH"/>
           </a:p>
@@ -1069,7 +1069,7 @@
           <a:p>
             <a:fld id="{1C34969C-F2FF-4877-8080-50A3B0756916}" type="slidenum">
               <a:rPr lang="de-CH" smtClean="0"/>
-              <a:t>‹#›</a:t>
+              <a:t>‹Nr.›</a:t>
             </a:fld>
             <a:endParaRPr lang="de-CH"/>
           </a:p>
@@ -1207,7 +1207,7 @@
           <a:p>
             <a:fld id="{9DB3CB91-4650-4E7E-8330-F432546D6CA1}" type="datetimeFigureOut">
               <a:rPr lang="de-CH" smtClean="0"/>
-              <a:t>18.12.2018</a:t>
+              <a:t>18.12.18</a:t>
             </a:fld>
             <a:endParaRPr lang="de-CH"/>
           </a:p>
@@ -1249,7 +1249,7 @@
           <a:p>
             <a:fld id="{1C34969C-F2FF-4877-8080-50A3B0756916}" type="slidenum">
               <a:rPr lang="de-CH" smtClean="0"/>
-              <a:t>‹#›</a:t>
+              <a:t>‹Nr.›</a:t>
             </a:fld>
             <a:endParaRPr lang="de-CH"/>
           </a:p>
@@ -1377,7 +1377,7 @@
           <a:p>
             <a:fld id="{9DB3CB91-4650-4E7E-8330-F432546D6CA1}" type="datetimeFigureOut">
               <a:rPr lang="de-CH" smtClean="0"/>
-              <a:t>18.12.2018</a:t>
+              <a:t>18.12.18</a:t>
             </a:fld>
             <a:endParaRPr lang="de-CH"/>
           </a:p>
@@ -1419,7 +1419,7 @@
           <a:p>
             <a:fld id="{1C34969C-F2FF-4877-8080-50A3B0756916}" type="slidenum">
               <a:rPr lang="de-CH" smtClean="0"/>
-              <a:t>‹#›</a:t>
+              <a:t>‹Nr.›</a:t>
             </a:fld>
             <a:endParaRPr lang="de-CH"/>
           </a:p>
@@ -1623,7 +1623,7 @@
           <a:p>
             <a:fld id="{9DB3CB91-4650-4E7E-8330-F432546D6CA1}" type="datetimeFigureOut">
               <a:rPr lang="de-CH" smtClean="0"/>
-              <a:t>18.12.2018</a:t>
+              <a:t>18.12.18</a:t>
             </a:fld>
             <a:endParaRPr lang="de-CH"/>
           </a:p>
@@ -1665,7 +1665,7 @@
           <a:p>
             <a:fld id="{1C34969C-F2FF-4877-8080-50A3B0756916}" type="slidenum">
               <a:rPr lang="de-CH" smtClean="0"/>
-              <a:t>‹#›</a:t>
+              <a:t>‹Nr.›</a:t>
             </a:fld>
             <a:endParaRPr lang="de-CH"/>
           </a:p>
@@ -1855,7 +1855,7 @@
           <a:p>
             <a:fld id="{9DB3CB91-4650-4E7E-8330-F432546D6CA1}" type="datetimeFigureOut">
               <a:rPr lang="de-CH" smtClean="0"/>
-              <a:t>18.12.2018</a:t>
+              <a:t>18.12.18</a:t>
             </a:fld>
             <a:endParaRPr lang="de-CH"/>
           </a:p>
@@ -1897,7 +1897,7 @@
           <a:p>
             <a:fld id="{1C34969C-F2FF-4877-8080-50A3B0756916}" type="slidenum">
               <a:rPr lang="de-CH" smtClean="0"/>
-              <a:t>‹#›</a:t>
+              <a:t>‹Nr.›</a:t>
             </a:fld>
             <a:endParaRPr lang="de-CH"/>
           </a:p>
@@ -2222,7 +2222,7 @@
           <a:p>
             <a:fld id="{9DB3CB91-4650-4E7E-8330-F432546D6CA1}" type="datetimeFigureOut">
               <a:rPr lang="de-CH" smtClean="0"/>
-              <a:t>18.12.2018</a:t>
+              <a:t>18.12.18</a:t>
             </a:fld>
             <a:endParaRPr lang="de-CH"/>
           </a:p>
@@ -2264,7 +2264,7 @@
           <a:p>
             <a:fld id="{1C34969C-F2FF-4877-8080-50A3B0756916}" type="slidenum">
               <a:rPr lang="de-CH" smtClean="0"/>
-              <a:t>‹#›</a:t>
+              <a:t>‹Nr.›</a:t>
             </a:fld>
             <a:endParaRPr lang="de-CH"/>
           </a:p>
@@ -2340,7 +2340,7 @@
           <a:p>
             <a:fld id="{9DB3CB91-4650-4E7E-8330-F432546D6CA1}" type="datetimeFigureOut">
               <a:rPr lang="de-CH" smtClean="0"/>
-              <a:t>18.12.2018</a:t>
+              <a:t>18.12.18</a:t>
             </a:fld>
             <a:endParaRPr lang="de-CH"/>
           </a:p>
@@ -2382,7 +2382,7 @@
           <a:p>
             <a:fld id="{1C34969C-F2FF-4877-8080-50A3B0756916}" type="slidenum">
               <a:rPr lang="de-CH" smtClean="0"/>
-              <a:t>‹#›</a:t>
+              <a:t>‹Nr.›</a:t>
             </a:fld>
             <a:endParaRPr lang="de-CH"/>
           </a:p>
@@ -2435,7 +2435,7 @@
           <a:p>
             <a:fld id="{9DB3CB91-4650-4E7E-8330-F432546D6CA1}" type="datetimeFigureOut">
               <a:rPr lang="de-CH" smtClean="0"/>
-              <a:t>18.12.2018</a:t>
+              <a:t>18.12.18</a:t>
             </a:fld>
             <a:endParaRPr lang="de-CH"/>
           </a:p>
@@ -2477,7 +2477,7 @@
           <a:p>
             <a:fld id="{1C34969C-F2FF-4877-8080-50A3B0756916}" type="slidenum">
               <a:rPr lang="de-CH" smtClean="0"/>
-              <a:t>‹#›</a:t>
+              <a:t>‹Nr.›</a:t>
             </a:fld>
             <a:endParaRPr lang="de-CH"/>
           </a:p>
@@ -2712,7 +2712,7 @@
           <a:p>
             <a:fld id="{9DB3CB91-4650-4E7E-8330-F432546D6CA1}" type="datetimeFigureOut">
               <a:rPr lang="de-CH" smtClean="0"/>
-              <a:t>18.12.2018</a:t>
+              <a:t>18.12.18</a:t>
             </a:fld>
             <a:endParaRPr lang="de-CH"/>
           </a:p>
@@ -2754,7 +2754,7 @@
           <a:p>
             <a:fld id="{1C34969C-F2FF-4877-8080-50A3B0756916}" type="slidenum">
               <a:rPr lang="de-CH" smtClean="0"/>
-              <a:t>‹#›</a:t>
+              <a:t>‹Nr.›</a:t>
             </a:fld>
             <a:endParaRPr lang="de-CH"/>
           </a:p>
@@ -2965,7 +2965,7 @@
           <a:p>
             <a:fld id="{9DB3CB91-4650-4E7E-8330-F432546D6CA1}" type="datetimeFigureOut">
               <a:rPr lang="de-CH" smtClean="0"/>
-              <a:t>18.12.2018</a:t>
+              <a:t>18.12.18</a:t>
             </a:fld>
             <a:endParaRPr lang="de-CH"/>
           </a:p>
@@ -3007,7 +3007,7 @@
           <a:p>
             <a:fld id="{1C34969C-F2FF-4877-8080-50A3B0756916}" type="slidenum">
               <a:rPr lang="de-CH" smtClean="0"/>
-              <a:t>‹#›</a:t>
+              <a:t>‹Nr.›</a:t>
             </a:fld>
             <a:endParaRPr lang="de-CH"/>
           </a:p>
@@ -3071,7 +3071,7 @@
           </a:solidFill>
         </p:spPr>
         <p:txBody>
-          <a:bodyPr vert="horz" lIns="360000" tIns="360000" rIns="360000" bIns="360000" rtlCol="0" anchor="ctr">
+          <a:bodyPr vert="horz" lIns="360000" tIns="360000" rIns="360000" bIns="216000" rtlCol="0" anchor="ctr">
             <a:normAutofit/>
           </a:bodyPr>
           <a:lstStyle/>
@@ -3175,9 +3175,9 @@
                     <a:tint val="75000"/>
                   </a:schemeClr>
                 </a:solidFill>
-                <a:latin typeface="Marker Felt Thin" charset="0"/>
-                <a:ea typeface="Marker Felt Thin" charset="0"/>
-                <a:cs typeface="Marker Felt Thin" charset="0"/>
+                <a:latin typeface="Helvetica Neue" charset="0"/>
+                <a:ea typeface="Helvetica Neue" charset="0"/>
+                <a:cs typeface="Helvetica Neue" charset="0"/>
               </a:defRPr>
             </a:lvl1pPr>
           </a:lstStyle>
@@ -3185,7 +3185,7 @@
             <a:fld id="{9DB3CB91-4650-4E7E-8330-F432546D6CA1}" type="datetimeFigureOut">
               <a:rPr lang="de-CH" smtClean="0"/>
               <a:pPr/>
-              <a:t>18.12.2018</a:t>
+              <a:t>18.12.18</a:t>
             </a:fld>
             <a:endParaRPr lang="de-CH"/>
           </a:p>
@@ -3220,9 +3220,9 @@
                     <a:tint val="75000"/>
                   </a:schemeClr>
                 </a:solidFill>
-                <a:latin typeface="Marker Felt Thin" charset="0"/>
-                <a:ea typeface="Marker Felt Thin" charset="0"/>
-                <a:cs typeface="Marker Felt Thin" charset="0"/>
+                <a:latin typeface="Helvetica Neue" charset="0"/>
+                <a:ea typeface="Helvetica Neue" charset="0"/>
+                <a:cs typeface="Helvetica Neue" charset="0"/>
               </a:defRPr>
             </a:lvl1pPr>
           </a:lstStyle>
@@ -3260,9 +3260,9 @@
                     <a:tint val="75000"/>
                   </a:schemeClr>
                 </a:solidFill>
-                <a:latin typeface="Marker Felt Thin" charset="0"/>
-                <a:ea typeface="Marker Felt Thin" charset="0"/>
-                <a:cs typeface="Marker Felt Thin" charset="0"/>
+                <a:latin typeface="Helvetica Neue" charset="0"/>
+                <a:ea typeface="Helvetica Neue" charset="0"/>
+                <a:cs typeface="Helvetica Neue" charset="0"/>
               </a:defRPr>
             </a:lvl1pPr>
           </a:lstStyle>
@@ -3270,7 +3270,7 @@
             <a:fld id="{1C34969C-F2FF-4877-8080-50A3B0756916}" type="slidenum">
               <a:rPr lang="de-CH" smtClean="0"/>
               <a:pPr/>
-              <a:t>‹#›</a:t>
+              <a:t>‹Nr.›</a:t>
             </a:fld>
             <a:endParaRPr lang="de-CH"/>
           </a:p>
@@ -3311,9 +3311,9 @@
           <a:solidFill>
             <a:schemeClr val="bg1"/>
           </a:solidFill>
-          <a:latin typeface="Marker Felt Thin" charset="0"/>
-          <a:ea typeface="Marker Felt Thin" charset="0"/>
-          <a:cs typeface="Marker Felt Thin" charset="0"/>
+          <a:latin typeface="Segoe Print" charset="0"/>
+          <a:ea typeface="Segoe Print" charset="0"/>
+          <a:cs typeface="Segoe Print" charset="0"/>
         </a:defRPr>
       </a:lvl1pPr>
     </p:titleStyle>
@@ -3331,9 +3331,9 @@
           <a:solidFill>
             <a:schemeClr val="tx1"/>
           </a:solidFill>
-          <a:latin typeface="Marker Felt Thin" charset="0"/>
-          <a:ea typeface="Marker Felt Thin" charset="0"/>
-          <a:cs typeface="Marker Felt Thin" charset="0"/>
+          <a:latin typeface="Helvetica Neue" charset="0"/>
+          <a:ea typeface="Helvetica Neue" charset="0"/>
+          <a:cs typeface="Helvetica Neue" charset="0"/>
         </a:defRPr>
       </a:lvl1pPr>
       <a:lvl2pPr marL="685800" indent="-228600" algn="l" defTabSz="914400" rtl="0" eaLnBrk="1" latinLnBrk="0" hangingPunct="1">
@@ -3349,9 +3349,9 @@
           <a:solidFill>
             <a:schemeClr val="tx1"/>
           </a:solidFill>
-          <a:latin typeface="Marker Felt Thin" charset="0"/>
-          <a:ea typeface="Marker Felt Thin" charset="0"/>
-          <a:cs typeface="Marker Felt Thin" charset="0"/>
+          <a:latin typeface="Helvetica Neue" charset="0"/>
+          <a:ea typeface="Helvetica Neue" charset="0"/>
+          <a:cs typeface="Helvetica Neue" charset="0"/>
         </a:defRPr>
       </a:lvl2pPr>
       <a:lvl3pPr marL="1143000" indent="-228600" algn="l" defTabSz="914400" rtl="0" eaLnBrk="1" latinLnBrk="0" hangingPunct="1">
@@ -3367,9 +3367,9 @@
           <a:solidFill>
             <a:schemeClr val="tx1"/>
           </a:solidFill>
-          <a:latin typeface="Marker Felt Thin" charset="0"/>
-          <a:ea typeface="Marker Felt Thin" charset="0"/>
-          <a:cs typeface="Marker Felt Thin" charset="0"/>
+          <a:latin typeface="Helvetica Neue" charset="0"/>
+          <a:ea typeface="Helvetica Neue" charset="0"/>
+          <a:cs typeface="Helvetica Neue" charset="0"/>
         </a:defRPr>
       </a:lvl3pPr>
       <a:lvl4pPr marL="1600200" indent="-228600" algn="l" defTabSz="914400" rtl="0" eaLnBrk="1" latinLnBrk="0" hangingPunct="1">
@@ -3385,9 +3385,9 @@
           <a:solidFill>
             <a:schemeClr val="tx1"/>
           </a:solidFill>
-          <a:latin typeface="Marker Felt Thin" charset="0"/>
-          <a:ea typeface="Marker Felt Thin" charset="0"/>
-          <a:cs typeface="Marker Felt Thin" charset="0"/>
+          <a:latin typeface="Helvetica Neue" charset="0"/>
+          <a:ea typeface="Helvetica Neue" charset="0"/>
+          <a:cs typeface="Helvetica Neue" charset="0"/>
         </a:defRPr>
       </a:lvl4pPr>
       <a:lvl5pPr marL="2057400" indent="-228600" algn="l" defTabSz="914400" rtl="0" eaLnBrk="1" latinLnBrk="0" hangingPunct="1">
@@ -3403,9 +3403,9 @@
           <a:solidFill>
             <a:schemeClr val="tx1"/>
           </a:solidFill>
-          <a:latin typeface="Marker Felt Thin" charset="0"/>
-          <a:ea typeface="Marker Felt Thin" charset="0"/>
-          <a:cs typeface="Marker Felt Thin" charset="0"/>
+          <a:latin typeface="Helvetica Neue" charset="0"/>
+          <a:ea typeface="Helvetica Neue" charset="0"/>
+          <a:cs typeface="Helvetica Neue" charset="0"/>
         </a:defRPr>
       </a:lvl5pPr>
       <a:lvl6pPr marL="2514600" indent="-228600" algn="l" defTabSz="914400" rtl="0" eaLnBrk="1" latinLnBrk="0" hangingPunct="1">
@@ -3764,17 +3764,27 @@
           <a:p>
             <a:r>
               <a:rPr lang="de-DE" sz="4800" dirty="0">
+                <a:latin typeface="Marker Felt Thin" charset="0"/>
+                <a:ea typeface="Marker Felt Thin" charset="0"/>
+                <a:cs typeface="Marker Felt Thin" charset="0"/>
                 <a:hlinkClick r:id="rId3"/>
               </a:rPr>
               <a:t>https://</a:t>
             </a:r>
             <a:r>
               <a:rPr lang="de-DE" sz="4800" dirty="0" smtClean="0">
+                <a:latin typeface="Marker Felt Thin" charset="0"/>
+                <a:ea typeface="Marker Felt Thin" charset="0"/>
+                <a:cs typeface="Marker Felt Thin" charset="0"/>
                 <a:hlinkClick r:id="rId3"/>
               </a:rPr>
               <a:t>scratch.mit.edu</a:t>
             </a:r>
-            <a:endParaRPr lang="de-DE" sz="4800" dirty="0"/>
+            <a:endParaRPr lang="de-DE" sz="4800" dirty="0">
+              <a:latin typeface="Marker Felt Thin" charset="0"/>
+              <a:ea typeface="Marker Felt Thin" charset="0"/>
+              <a:cs typeface="Marker Felt Thin" charset="0"/>
+            </a:endParaRPr>
           </a:p>
         </p:txBody>
       </p:sp>
@@ -3911,11 +3921,7 @@
           <a:p>
             <a:r>
               <a:rPr lang="de-CH" dirty="0" smtClean="0"/>
-              <a:t>2007 von </a:t>
-            </a:r>
-            <a:r>
-              <a:rPr lang="de-CH" dirty="0" smtClean="0"/>
-              <a:t>MIT Professor Mitchel </a:t>
+              <a:t>2007 von MIT Professor Mitchel </a:t>
             </a:r>
             <a:r>
               <a:rPr lang="de-CH" dirty="0" err="1" smtClean="0"/>
@@ -3944,14 +3950,12 @@
               <a:rPr lang="de-CH" dirty="0" smtClean="0"/>
               <a:t> Release 3.0</a:t>
             </a:r>
-            <a:endParaRPr lang="de-CH" dirty="0" smtClean="0"/>
           </a:p>
           <a:p>
             <a:r>
               <a:rPr lang="de-CH" dirty="0" smtClean="0"/>
               <a:t>Webbasierte IDE (HTML5)</a:t>
             </a:r>
-            <a:endParaRPr lang="de-CH" dirty="0" smtClean="0"/>
           </a:p>
           <a:p>
             <a:r>
@@ -3960,28 +3964,44 @@
             </a:r>
           </a:p>
           <a:p>
-            <a:pPr lvl="1"/>
+            <a:pPr lvl="1">
+              <a:lnSpc>
+                <a:spcPct val="120000"/>
+              </a:lnSpc>
+            </a:pPr>
             <a:r>
               <a:rPr lang="de-CH" dirty="0" smtClean="0"/>
               <a:t>Visuell</a:t>
             </a:r>
           </a:p>
           <a:p>
-            <a:pPr lvl="1"/>
+            <a:pPr lvl="1">
+              <a:lnSpc>
+                <a:spcPct val="120000"/>
+              </a:lnSpc>
+            </a:pPr>
             <a:r>
               <a:rPr lang="de-CH" dirty="0" smtClean="0"/>
               <a:t>Imperativ</a:t>
             </a:r>
           </a:p>
           <a:p>
-            <a:pPr lvl="1"/>
+            <a:pPr lvl="1">
+              <a:lnSpc>
+                <a:spcPct val="120000"/>
+              </a:lnSpc>
+            </a:pPr>
             <a:r>
               <a:rPr lang="de-CH" dirty="0" smtClean="0"/>
               <a:t>Objektorientiert</a:t>
             </a:r>
           </a:p>
           <a:p>
-            <a:pPr lvl="1"/>
+            <a:pPr lvl="1">
+              <a:lnSpc>
+                <a:spcPct val="120000"/>
+              </a:lnSpc>
+            </a:pPr>
             <a:r>
               <a:rPr lang="de-CH" dirty="0" smtClean="0"/>
               <a:t>Ereignisorientiert</a:t>
@@ -4150,7 +4170,11 @@
             </a:r>
           </a:p>
           <a:p>
-            <a:pPr lvl="1"/>
+            <a:pPr lvl="1">
+              <a:lnSpc>
+                <a:spcPct val="120000"/>
+              </a:lnSpc>
+            </a:pPr>
             <a:r>
               <a:rPr lang="de-CH" dirty="0" smtClean="0"/>
               <a:t>Beliebig viele</a:t>
@@ -4852,21 +4876,33 @@
             </a:r>
           </a:p>
           <a:p>
-            <a:pPr lvl="1"/>
+            <a:pPr lvl="1">
+              <a:lnSpc>
+                <a:spcPct val="120000"/>
+              </a:lnSpc>
+            </a:pPr>
             <a:r>
               <a:rPr lang="de-CH" dirty="0" smtClean="0"/>
               <a:t>von Figuren gemacht werden (auch von anderen)</a:t>
             </a:r>
           </a:p>
           <a:p>
-            <a:pPr lvl="1"/>
+            <a:pPr lvl="1">
+              <a:lnSpc>
+                <a:spcPct val="120000"/>
+              </a:lnSpc>
+            </a:pPr>
             <a:r>
               <a:rPr lang="de-CH" dirty="0" smtClean="0"/>
               <a:t>gelöscht werden</a:t>
             </a:r>
           </a:p>
           <a:p>
-            <a:pPr lvl="1"/>
+            <a:pPr lvl="1">
+              <a:lnSpc>
+                <a:spcPct val="120000"/>
+              </a:lnSpc>
+            </a:pPr>
             <a:r>
               <a:rPr lang="de-CH" dirty="0" smtClean="0"/>
               <a:t>auf ihre eigene Entstehung reagieren</a:t>
@@ -4882,8 +4918,8 @@
         </p:nvGrpSpPr>
         <p:grpSpPr>
           <a:xfrm>
-            <a:off x="8703325" y="2243936"/>
-            <a:ext cx="2650475" cy="2786767"/>
+            <a:off x="8703325" y="3171015"/>
+            <a:ext cx="2650475" cy="2786768"/>
             <a:chOff x="9280889" y="2564760"/>
             <a:chExt cx="2072911" cy="2179504"/>
           </a:xfrm>
@@ -5145,7 +5181,7 @@
         </p:blipFill>
         <p:spPr>
           <a:xfrm>
-            <a:off x="7136075" y="4448682"/>
+            <a:off x="6941213" y="5333105"/>
             <a:ext cx="2541561" cy="633222"/>
           </a:xfrm>
           <a:prstGeom prst="rect">
@@ -5231,21 +5267,33 @@
             </a:r>
           </a:p>
           <a:p>
-            <a:pPr lvl="1"/>
+            <a:pPr lvl="1">
+              <a:lnSpc>
+                <a:spcPct val="120000"/>
+              </a:lnSpc>
+            </a:pPr>
             <a:r>
               <a:rPr lang="de-CH" dirty="0" smtClean="0"/>
               <a:t>Einsteigerfreundlich</a:t>
             </a:r>
           </a:p>
           <a:p>
-            <a:pPr lvl="1"/>
+            <a:pPr lvl="1">
+              <a:lnSpc>
+                <a:spcPct val="120000"/>
+              </a:lnSpc>
+            </a:pPr>
             <a:r>
               <a:rPr lang="de-CH" dirty="0" smtClean="0"/>
               <a:t>Lehr-Sprache</a:t>
             </a:r>
           </a:p>
           <a:p>
-            <a:pPr lvl="1"/>
+            <a:pPr lvl="1">
+              <a:lnSpc>
+                <a:spcPct val="120000"/>
+              </a:lnSpc>
+            </a:pPr>
             <a:r>
               <a:rPr lang="de-CH" dirty="0" smtClean="0"/>
               <a:t>Anregung zu Kreativität, systematischem Denken und Kooperation</a:t>
@@ -5280,6 +5328,66 @@
           </a:p>
         </p:txBody>
       </p:sp>
+      <p:pic>
+        <p:nvPicPr>
+          <p:cNvPr id="4" name="Bild 3"/>
+          <p:cNvPicPr>
+            <a:picLocks noChangeAspect="1"/>
+          </p:cNvPicPr>
+          <p:nvPr/>
+        </p:nvPicPr>
+        <p:blipFill>
+          <a:blip r:embed="rId2" cstate="print">
+            <a:extLst>
+              <a:ext uri="{28A0092B-C50C-407E-A947-70E740481C1C}">
+                <a14:useLocalDpi xmlns:a14="http://schemas.microsoft.com/office/drawing/2010/main" val="0"/>
+              </a:ext>
+            </a:extLst>
+          </a:blip>
+          <a:stretch>
+            <a:fillRect/>
+          </a:stretch>
+        </p:blipFill>
+        <p:spPr>
+          <a:xfrm flipH="1">
+            <a:off x="9255871" y="533945"/>
+            <a:ext cx="1217394" cy="1346371"/>
+          </a:xfrm>
+          <a:prstGeom prst="rect">
+            <a:avLst/>
+          </a:prstGeom>
+        </p:spPr>
+      </p:pic>
+      <p:pic>
+        <p:nvPicPr>
+          <p:cNvPr id="5" name="Bild 4"/>
+          <p:cNvPicPr>
+            <a:picLocks noChangeAspect="1"/>
+          </p:cNvPicPr>
+          <p:nvPr/>
+        </p:nvPicPr>
+        <p:blipFill>
+          <a:blip r:embed="rId2" cstate="print">
+            <a:extLst>
+              <a:ext uri="{28A0092B-C50C-407E-A947-70E740481C1C}">
+                <a14:useLocalDpi xmlns:a14="http://schemas.microsoft.com/office/drawing/2010/main" val="0"/>
+              </a:ext>
+            </a:extLst>
+          </a:blip>
+          <a:stretch>
+            <a:fillRect/>
+          </a:stretch>
+        </p:blipFill>
+        <p:spPr>
+          <a:xfrm>
+            <a:off x="7959221" y="365125"/>
+            <a:ext cx="1217394" cy="1346371"/>
+          </a:xfrm>
+          <a:prstGeom prst="rect">
+            <a:avLst/>
+          </a:prstGeom>
+        </p:spPr>
+      </p:pic>
     </p:spTree>
     <p:extLst>
       <p:ext uri="{BB962C8B-B14F-4D97-AF65-F5344CB8AC3E}">
@@ -5322,7 +5430,9 @@
         </p:nvSpPr>
         <p:spPr/>
         <p:txBody>
-          <a:bodyPr/>
+          <a:bodyPr>
+            <a:normAutofit fontScale="90000"/>
+          </a:bodyPr>
           <a:lstStyle/>
           <a:p>
             <a:r>
@@ -5376,14 +5486,22 @@
             </a:r>
           </a:p>
           <a:p>
-            <a:pPr lvl="1"/>
+            <a:pPr lvl="1">
+              <a:lnSpc>
+                <a:spcPct val="120000"/>
+              </a:lnSpc>
+            </a:pPr>
             <a:r>
               <a:rPr lang="de-CH" dirty="0" smtClean="0"/>
               <a:t>Starke Trennung von Komponenten</a:t>
             </a:r>
           </a:p>
           <a:p>
-            <a:pPr lvl="1"/>
+            <a:pPr lvl="1">
+              <a:lnSpc>
+                <a:spcPct val="120000"/>
+              </a:lnSpc>
+            </a:pPr>
             <a:r>
               <a:rPr lang="de-CH" dirty="0" smtClean="0"/>
               <a:t>Sehr einfache Parallelisierung</a:t>
@@ -5450,7 +5568,9 @@
         </p:nvSpPr>
         <p:spPr/>
         <p:txBody>
-          <a:bodyPr/>
+          <a:bodyPr>
+            <a:normAutofit fontScale="90000"/>
+          </a:bodyPr>
           <a:lstStyle/>
           <a:p>
             <a:r>
@@ -5492,14 +5612,22 @@
             </a:r>
           </a:p>
           <a:p>
-            <a:pPr lvl="1"/>
+            <a:pPr lvl="1">
+              <a:lnSpc>
+                <a:spcPct val="120000"/>
+              </a:lnSpc>
+            </a:pPr>
             <a:r>
               <a:rPr lang="de-CH" dirty="0" smtClean="0"/>
               <a:t>Viele Projekte</a:t>
             </a:r>
           </a:p>
           <a:p>
-            <a:pPr lvl="1"/>
+            <a:pPr lvl="1">
+              <a:lnSpc>
+                <a:spcPct val="120000"/>
+              </a:lnSpc>
+            </a:pPr>
             <a:r>
               <a:rPr lang="de-CH" dirty="0" err="1" smtClean="0"/>
               <a:t>Remixes</a:t>

</xml_diff>